<commit_message>
bubble plot study 1
</commit_message>
<xml_diff>
--- a/bubleplots.pptx
+++ b/bubleplots.pptx
@@ -5,8 +5,9 @@
     <p:sldMasterId id="2147483660" r:id="rId1"/>
   </p:sldMasterIdLst>
   <p:sldIdLst>
-    <p:sldId id="266" r:id="rId2"/>
-    <p:sldId id="257" r:id="rId3"/>
+    <p:sldId id="267" r:id="rId2"/>
+    <p:sldId id="266" r:id="rId3"/>
+    <p:sldId id="268" r:id="rId4"/>
   </p:sldIdLst>
   <p:sldSz cx="9144000" cy="6858000" type="screen4x3"/>
   <p:notesSz cx="6858000" cy="9144000"/>
@@ -116,7 +117,7 @@
 <file path=ppt/revisionInfo.xml><?xml version="1.0" encoding="utf-8"?>
 <p1510:revInfo xmlns:a="http://schemas.openxmlformats.org/drawingml/2006/main" xmlns:r="http://schemas.openxmlformats.org/officeDocument/2006/relationships" xmlns:p1510="http://schemas.microsoft.com/office/powerpoint/2015/10/main">
   <p1510:revLst>
-    <p1510:client id="{BD409E65-DA0C-4C99-81B5-98E95D8F4708}" v="91" dt="2024-03-12T17:51:59.190"/>
+    <p1510:client id="{BD409E65-DA0C-4C99-81B5-98E95D8F4708}" v="109" dt="2024-03-13T17:42:28.395"/>
   </p1510:revLst>
 </p1510:revInfo>
 </file>
@@ -126,7 +127,7 @@
   <pc:docChgLst>
     <pc:chgData name="Saulo Gil" userId="e4b858b1fb629067" providerId="LiveId" clId="{BD409E65-DA0C-4C99-81B5-98E95D8F4708}"/>
     <pc:docChg chg="undo custSel addSld delSld modSld sldOrd modMainMaster">
-      <pc:chgData name="Saulo Gil" userId="e4b858b1fb629067" providerId="LiveId" clId="{BD409E65-DA0C-4C99-81B5-98E95D8F4708}" dt="2024-03-12T17:54:42.062" v="213"/>
+      <pc:chgData name="Saulo Gil" userId="e4b858b1fb629067" providerId="LiveId" clId="{BD409E65-DA0C-4C99-81B5-98E95D8F4708}" dt="2024-03-13T17:42:31.813" v="405" actId="20577"/>
       <pc:docMkLst>
         <pc:docMk/>
       </pc:docMkLst>
@@ -256,8 +257,8 @@
           <pc:sldMk cId="2698044611" sldId="256"/>
         </pc:sldMkLst>
       </pc:sldChg>
-      <pc:sldChg chg="addSp delSp modSp new mod ord">
-        <pc:chgData name="Saulo Gil" userId="e4b858b1fb629067" providerId="LiveId" clId="{BD409E65-DA0C-4C99-81B5-98E95D8F4708}" dt="2024-03-12T17:50:19.949" v="199" actId="1076"/>
+      <pc:sldChg chg="addSp delSp modSp new del mod ord">
+        <pc:chgData name="Saulo Gil" userId="e4b858b1fb629067" providerId="LiveId" clId="{BD409E65-DA0C-4C99-81B5-98E95D8F4708}" dt="2024-03-13T17:41:50.034" v="375" actId="47"/>
         <pc:sldMkLst>
           <pc:docMk/>
           <pc:sldMk cId="1513017753" sldId="257"/>
@@ -538,19 +539,27 @@
         </pc:sldMkLst>
       </pc:sldChg>
       <pc:sldChg chg="addSp delSp modSp add mod ord">
-        <pc:chgData name="Saulo Gil" userId="e4b858b1fb629067" providerId="LiveId" clId="{BD409E65-DA0C-4C99-81B5-98E95D8F4708}" dt="2024-03-12T17:54:42.062" v="213"/>
+        <pc:chgData name="Saulo Gil" userId="e4b858b1fb629067" providerId="LiveId" clId="{BD409E65-DA0C-4C99-81B5-98E95D8F4708}" dt="2024-03-13T17:41:42.280" v="374" actId="478"/>
         <pc:sldMkLst>
           <pc:docMk/>
           <pc:sldMk cId="2508867880" sldId="266"/>
         </pc:sldMkLst>
         <pc:spChg chg="add mod ord">
-          <ac:chgData name="Saulo Gil" userId="e4b858b1fb629067" providerId="LiveId" clId="{BD409E65-DA0C-4C99-81B5-98E95D8F4708}" dt="2024-03-12T17:50:09.938" v="197"/>
+          <ac:chgData name="Saulo Gil" userId="e4b858b1fb629067" providerId="LiveId" clId="{BD409E65-DA0C-4C99-81B5-98E95D8F4708}" dt="2024-03-13T17:33:51.311" v="291" actId="167"/>
           <ac:spMkLst>
             <pc:docMk/>
             <pc:sldMk cId="2508867880" sldId="266"/>
             <ac:spMk id="4" creationId="{AC7A3F2F-10F5-00F4-967B-BD7AFCCDBD08}"/>
           </ac:spMkLst>
         </pc:spChg>
+        <pc:picChg chg="add mod">
+          <ac:chgData name="Saulo Gil" userId="e4b858b1fb629067" providerId="LiveId" clId="{BD409E65-DA0C-4C99-81B5-98E95D8F4708}" dt="2024-03-13T17:29:56.389" v="262" actId="1076"/>
+          <ac:picMkLst>
+            <pc:docMk/>
+            <pc:sldMk cId="2508867880" sldId="266"/>
+            <ac:picMk id="2" creationId="{3FDC1E89-898E-73FF-429B-C110FC3E2CE7}"/>
+          </ac:picMkLst>
+        </pc:picChg>
         <pc:picChg chg="add del mod modCrop">
           <ac:chgData name="Saulo Gil" userId="e4b858b1fb629067" providerId="LiveId" clId="{BD409E65-DA0C-4C99-81B5-98E95D8F4708}" dt="2024-03-12T17:42:44.439" v="149" actId="478"/>
           <ac:picMkLst>
@@ -559,8 +568,8 @@
             <ac:picMk id="2" creationId="{FAB855EB-AA2C-E632-4449-1556324AF77A}"/>
           </ac:picMkLst>
         </pc:picChg>
-        <pc:picChg chg="add mod modCrop">
-          <ac:chgData name="Saulo Gil" userId="e4b858b1fb629067" providerId="LiveId" clId="{BD409E65-DA0C-4C99-81B5-98E95D8F4708}" dt="2024-03-12T17:50:09.938" v="197"/>
+        <pc:picChg chg="add del mod modCrop">
+          <ac:chgData name="Saulo Gil" userId="e4b858b1fb629067" providerId="LiveId" clId="{BD409E65-DA0C-4C99-81B5-98E95D8F4708}" dt="2024-03-13T17:32:37.270" v="284" actId="478"/>
           <ac:picMkLst>
             <pc:docMk/>
             <pc:sldMk cId="2508867880" sldId="266"/>
@@ -575,6 +584,22 @@
             <ac:picMk id="5" creationId="{59DC75AC-3866-B21E-F9B9-9C3E9EF6A14A}"/>
           </ac:picMkLst>
         </pc:picChg>
+        <pc:picChg chg="add mod">
+          <ac:chgData name="Saulo Gil" userId="e4b858b1fb629067" providerId="LiveId" clId="{BD409E65-DA0C-4C99-81B5-98E95D8F4708}" dt="2024-03-13T17:40:31.724" v="362" actId="1037"/>
+          <ac:picMkLst>
+            <pc:docMk/>
+            <pc:sldMk cId="2508867880" sldId="266"/>
+            <ac:picMk id="5" creationId="{F12DB447-3D92-049E-D31D-6FF979102FB4}"/>
+          </ac:picMkLst>
+        </pc:picChg>
+        <pc:picChg chg="add mod">
+          <ac:chgData name="Saulo Gil" userId="e4b858b1fb629067" providerId="LiveId" clId="{BD409E65-DA0C-4C99-81B5-98E95D8F4708}" dt="2024-03-13T17:36:36.696" v="301" actId="1038"/>
+          <ac:picMkLst>
+            <pc:docMk/>
+            <pc:sldMk cId="2508867880" sldId="266"/>
+            <ac:picMk id="6" creationId="{5AF94036-AAE3-3BEB-418E-E282D2155485}"/>
+          </ac:picMkLst>
+        </pc:picChg>
         <pc:picChg chg="add del">
           <ac:chgData name="Saulo Gil" userId="e4b858b1fb629067" providerId="LiveId" clId="{BD409E65-DA0C-4C99-81B5-98E95D8F4708}" dt="2024-03-12T17:48:06.245" v="172" actId="21"/>
           <ac:picMkLst>
@@ -583,84 +608,156 @@
             <ac:picMk id="6" creationId="{DB500B3F-D0D6-35CE-80A1-9215FE730722}"/>
           </ac:picMkLst>
         </pc:picChg>
-        <pc:picChg chg="mod">
-          <ac:chgData name="Saulo Gil" userId="e4b858b1fb629067" providerId="LiveId" clId="{BD409E65-DA0C-4C99-81B5-98E95D8F4708}" dt="2024-03-12T17:50:09.938" v="197"/>
+        <pc:picChg chg="add mod">
+          <ac:chgData name="Saulo Gil" userId="e4b858b1fb629067" providerId="LiveId" clId="{BD409E65-DA0C-4C99-81B5-98E95D8F4708}" dt="2024-03-13T17:40:33.061" v="363" actId="1037"/>
+          <ac:picMkLst>
+            <pc:docMk/>
+            <pc:sldMk cId="2508867880" sldId="266"/>
+            <ac:picMk id="7" creationId="{77DEA35D-E2D3-C882-FAB6-46E917D65EE0}"/>
+          </ac:picMkLst>
+        </pc:picChg>
+        <pc:picChg chg="add mod">
+          <ac:chgData name="Saulo Gil" userId="e4b858b1fb629067" providerId="LiveId" clId="{BD409E65-DA0C-4C99-81B5-98E95D8F4708}" dt="2024-03-13T17:37:52.216" v="302" actId="1038"/>
+          <ac:picMkLst>
+            <pc:docMk/>
+            <pc:sldMk cId="2508867880" sldId="266"/>
+            <ac:picMk id="8" creationId="{5C014F31-A146-B561-AFDF-4208F5769FC5}"/>
+          </ac:picMkLst>
+        </pc:picChg>
+        <pc:picChg chg="add mod">
+          <ac:chgData name="Saulo Gil" userId="e4b858b1fb629067" providerId="LiveId" clId="{BD409E65-DA0C-4C99-81B5-98E95D8F4708}" dt="2024-03-13T17:40:13.496" v="359" actId="1037"/>
+          <ac:picMkLst>
+            <pc:docMk/>
+            <pc:sldMk cId="2508867880" sldId="266"/>
+            <ac:picMk id="9" creationId="{3071FA86-1280-434B-2A00-BA0FDC3FF487}"/>
+          </ac:picMkLst>
+        </pc:picChg>
+        <pc:picChg chg="del mod">
+          <ac:chgData name="Saulo Gil" userId="e4b858b1fb629067" providerId="LiveId" clId="{BD409E65-DA0C-4C99-81B5-98E95D8F4708}" dt="2024-03-13T17:29:38.838" v="251" actId="478"/>
           <ac:picMkLst>
             <pc:docMk/>
             <pc:sldMk cId="2508867880" sldId="266"/>
             <ac:picMk id="10" creationId="{8D919FD1-6B6D-903C-DB63-D85DFE4859C9}"/>
           </ac:picMkLst>
         </pc:picChg>
-        <pc:picChg chg="mod">
-          <ac:chgData name="Saulo Gil" userId="e4b858b1fb629067" providerId="LiveId" clId="{BD409E65-DA0C-4C99-81B5-98E95D8F4708}" dt="2024-03-12T17:50:09.938" v="197"/>
+        <pc:picChg chg="del mod">
+          <ac:chgData name="Saulo Gil" userId="e4b858b1fb629067" providerId="LiveId" clId="{BD409E65-DA0C-4C99-81B5-98E95D8F4708}" dt="2024-03-13T17:29:39.309" v="252" actId="478"/>
           <ac:picMkLst>
             <pc:docMk/>
             <pc:sldMk cId="2508867880" sldId="266"/>
             <ac:picMk id="11" creationId="{D227A22C-FC44-8E51-2D6E-820DE4F6219D}"/>
           </ac:picMkLst>
         </pc:picChg>
-        <pc:picChg chg="mod">
-          <ac:chgData name="Saulo Gil" userId="e4b858b1fb629067" providerId="LiveId" clId="{BD409E65-DA0C-4C99-81B5-98E95D8F4708}" dt="2024-03-12T17:50:09.938" v="197"/>
+        <pc:picChg chg="del mod">
+          <ac:chgData name="Saulo Gil" userId="e4b858b1fb629067" providerId="LiveId" clId="{BD409E65-DA0C-4C99-81B5-98E95D8F4708}" dt="2024-03-13T17:29:39.837" v="253" actId="478"/>
           <ac:picMkLst>
             <pc:docMk/>
             <pc:sldMk cId="2508867880" sldId="266"/>
             <ac:picMk id="12" creationId="{76A567B2-09C5-A4C9-1275-418503FAB3D9}"/>
           </ac:picMkLst>
         </pc:picChg>
-        <pc:picChg chg="mod">
-          <ac:chgData name="Saulo Gil" userId="e4b858b1fb629067" providerId="LiveId" clId="{BD409E65-DA0C-4C99-81B5-98E95D8F4708}" dt="2024-03-12T17:50:09.938" v="197"/>
+        <pc:picChg chg="del mod">
+          <ac:chgData name="Saulo Gil" userId="e4b858b1fb629067" providerId="LiveId" clId="{BD409E65-DA0C-4C99-81B5-98E95D8F4708}" dt="2024-03-13T17:29:40.253" v="254" actId="478"/>
           <ac:picMkLst>
             <pc:docMk/>
             <pc:sldMk cId="2508867880" sldId="266"/>
             <ac:picMk id="13" creationId="{F2A0E9AF-B4FF-64FD-EE1E-46A8BADCD111}"/>
           </ac:picMkLst>
         </pc:picChg>
-        <pc:picChg chg="mod">
-          <ac:chgData name="Saulo Gil" userId="e4b858b1fb629067" providerId="LiveId" clId="{BD409E65-DA0C-4C99-81B5-98E95D8F4708}" dt="2024-03-12T17:50:09.938" v="197"/>
+        <pc:picChg chg="del mod">
+          <ac:chgData name="Saulo Gil" userId="e4b858b1fb629067" providerId="LiveId" clId="{BD409E65-DA0C-4C99-81B5-98E95D8F4708}" dt="2024-03-13T17:29:40.789" v="255" actId="478"/>
           <ac:picMkLst>
             <pc:docMk/>
             <pc:sldMk cId="2508867880" sldId="266"/>
             <ac:picMk id="14" creationId="{2C2EE77F-6669-F312-233A-0AEFC39C0200}"/>
           </ac:picMkLst>
         </pc:picChg>
-        <pc:picChg chg="mod">
-          <ac:chgData name="Saulo Gil" userId="e4b858b1fb629067" providerId="LiveId" clId="{BD409E65-DA0C-4C99-81B5-98E95D8F4708}" dt="2024-03-12T17:50:09.938" v="197"/>
+        <pc:picChg chg="add mod">
+          <ac:chgData name="Saulo Gil" userId="e4b858b1fb629067" providerId="LiveId" clId="{BD409E65-DA0C-4C99-81B5-98E95D8F4708}" dt="2024-03-13T17:37:56.949" v="304" actId="1038"/>
+          <ac:picMkLst>
+            <pc:docMk/>
+            <pc:sldMk cId="2508867880" sldId="266"/>
+            <ac:picMk id="15" creationId="{672A3D43-D3B1-85B4-24F2-36953BD56F95}"/>
+          </ac:picMkLst>
+        </pc:picChg>
+        <pc:picChg chg="del mod">
+          <ac:chgData name="Saulo Gil" userId="e4b858b1fb629067" providerId="LiveId" clId="{BD409E65-DA0C-4C99-81B5-98E95D8F4708}" dt="2024-03-13T17:29:41.305" v="256" actId="478"/>
           <ac:picMkLst>
             <pc:docMk/>
             <pc:sldMk cId="2508867880" sldId="266"/>
             <ac:picMk id="16" creationId="{2B0DAD7A-E08A-4EC5-6C0B-B8FA2B93890D}"/>
           </ac:picMkLst>
         </pc:picChg>
-        <pc:picChg chg="mod">
-          <ac:chgData name="Saulo Gil" userId="e4b858b1fb629067" providerId="LiveId" clId="{BD409E65-DA0C-4C99-81B5-98E95D8F4708}" dt="2024-03-12T17:50:09.938" v="197"/>
+        <pc:picChg chg="del mod">
+          <ac:chgData name="Saulo Gil" userId="e4b858b1fb629067" providerId="LiveId" clId="{BD409E65-DA0C-4C99-81B5-98E95D8F4708}" dt="2024-03-13T17:29:41.852" v="257" actId="478"/>
           <ac:picMkLst>
             <pc:docMk/>
             <pc:sldMk cId="2508867880" sldId="266"/>
             <ac:picMk id="17" creationId="{D025171D-24D4-67AD-A85C-A348DBF70F30}"/>
           </ac:picMkLst>
         </pc:picChg>
-        <pc:picChg chg="mod">
-          <ac:chgData name="Saulo Gil" userId="e4b858b1fb629067" providerId="LiveId" clId="{BD409E65-DA0C-4C99-81B5-98E95D8F4708}" dt="2024-03-12T17:50:09.938" v="197"/>
+        <pc:picChg chg="del mod">
+          <ac:chgData name="Saulo Gil" userId="e4b858b1fb629067" providerId="LiveId" clId="{BD409E65-DA0C-4C99-81B5-98E95D8F4708}" dt="2024-03-13T17:29:42.341" v="258" actId="478"/>
           <ac:picMkLst>
             <pc:docMk/>
             <pc:sldMk cId="2508867880" sldId="266"/>
             <ac:picMk id="18" creationId="{62B74169-9CDC-A97C-375C-9F3FBAC3450F}"/>
           </ac:picMkLst>
         </pc:picChg>
-        <pc:picChg chg="mod">
-          <ac:chgData name="Saulo Gil" userId="e4b858b1fb629067" providerId="LiveId" clId="{BD409E65-DA0C-4C99-81B5-98E95D8F4708}" dt="2024-03-12T17:50:09.938" v="197"/>
+        <pc:picChg chg="del mod">
+          <ac:chgData name="Saulo Gil" userId="e4b858b1fb629067" providerId="LiveId" clId="{BD409E65-DA0C-4C99-81B5-98E95D8F4708}" dt="2024-03-13T17:29:43.325" v="259" actId="478"/>
           <ac:picMkLst>
             <pc:docMk/>
             <pc:sldMk cId="2508867880" sldId="266"/>
             <ac:picMk id="19" creationId="{8313F395-974B-B1CD-2936-84C998255592}"/>
           </ac:picMkLst>
         </pc:picChg>
-        <pc:picChg chg="mod">
-          <ac:chgData name="Saulo Gil" userId="e4b858b1fb629067" providerId="LiveId" clId="{BD409E65-DA0C-4C99-81B5-98E95D8F4708}" dt="2024-03-12T17:50:09.938" v="197"/>
+        <pc:picChg chg="del mod">
+          <ac:chgData name="Saulo Gil" userId="e4b858b1fb629067" providerId="LiveId" clId="{BD409E65-DA0C-4C99-81B5-98E95D8F4708}" dt="2024-03-13T17:29:43.861" v="260" actId="478"/>
           <ac:picMkLst>
             <pc:docMk/>
             <pc:sldMk cId="2508867880" sldId="266"/>
             <ac:picMk id="20" creationId="{8A3659E5-B1AD-1F31-F675-81EF4063E3E3}"/>
+          </ac:picMkLst>
+        </pc:picChg>
+        <pc:picChg chg="add mod">
+          <ac:chgData name="Saulo Gil" userId="e4b858b1fb629067" providerId="LiveId" clId="{BD409E65-DA0C-4C99-81B5-98E95D8F4708}" dt="2024-03-13T17:40:09.207" v="358" actId="1037"/>
+          <ac:picMkLst>
+            <pc:docMk/>
+            <pc:sldMk cId="2508867880" sldId="266"/>
+            <ac:picMk id="21" creationId="{31BBCC00-D2E4-612A-35D9-FD5B342C5F2F}"/>
+          </ac:picMkLst>
+        </pc:picChg>
+        <pc:picChg chg="add mod">
+          <ac:chgData name="Saulo Gil" userId="e4b858b1fb629067" providerId="LiveId" clId="{BD409E65-DA0C-4C99-81B5-98E95D8F4708}" dt="2024-03-13T17:38:07.877" v="312" actId="1037"/>
+          <ac:picMkLst>
+            <pc:docMk/>
+            <pc:sldMk cId="2508867880" sldId="266"/>
+            <ac:picMk id="22" creationId="{9B312BA5-246D-5A0C-522D-1D76EE1E39BE}"/>
+          </ac:picMkLst>
+        </pc:picChg>
+        <pc:picChg chg="add mod">
+          <ac:chgData name="Saulo Gil" userId="e4b858b1fb629067" providerId="LiveId" clId="{BD409E65-DA0C-4C99-81B5-98E95D8F4708}" dt="2024-03-13T17:39:34.293" v="357" actId="1037"/>
+          <ac:picMkLst>
+            <pc:docMk/>
+            <pc:sldMk cId="2508867880" sldId="266"/>
+            <ac:picMk id="23" creationId="{7160DC83-F864-F4A7-8A15-DF159570D1DB}"/>
+          </ac:picMkLst>
+        </pc:picChg>
+        <pc:picChg chg="add mod modCrop">
+          <ac:chgData name="Saulo Gil" userId="e4b858b1fb629067" providerId="LiveId" clId="{BD409E65-DA0C-4C99-81B5-98E95D8F4708}" dt="2024-03-13T17:33:55.477" v="292" actId="1076"/>
+          <ac:picMkLst>
+            <pc:docMk/>
+            <pc:sldMk cId="2508867880" sldId="266"/>
+            <ac:picMk id="24" creationId="{908B4967-6650-216E-5C68-EEDE51699F3A}"/>
+          </ac:picMkLst>
+        </pc:picChg>
+        <pc:picChg chg="add del mod modCrop">
+          <ac:chgData name="Saulo Gil" userId="e4b858b1fb629067" providerId="LiveId" clId="{BD409E65-DA0C-4C99-81B5-98E95D8F4708}" dt="2024-03-13T17:41:42.280" v="374" actId="478"/>
+          <ac:picMkLst>
+            <pc:docMk/>
+            <pc:sldMk cId="2508867880" sldId="266"/>
+            <ac:picMk id="25" creationId="{D30D93AA-11B6-6419-D835-826F176B651F}"/>
           </ac:picMkLst>
         </pc:picChg>
       </pc:sldChg>
@@ -694,6 +791,21 @@
           </ac:picMkLst>
         </pc:picChg>
       </pc:sldChg>
+      <pc:sldChg chg="addSp modSp new mod ord">
+        <pc:chgData name="Saulo Gil" userId="e4b858b1fb629067" providerId="LiveId" clId="{BD409E65-DA0C-4C99-81B5-98E95D8F4708}" dt="2024-03-13T17:42:20.122" v="400" actId="113"/>
+        <pc:sldMkLst>
+          <pc:docMk/>
+          <pc:sldMk cId="1838234662" sldId="267"/>
+        </pc:sldMkLst>
+        <pc:spChg chg="add mod">
+          <ac:chgData name="Saulo Gil" userId="e4b858b1fb629067" providerId="LiveId" clId="{BD409E65-DA0C-4C99-81B5-98E95D8F4708}" dt="2024-03-13T17:42:20.122" v="400" actId="113"/>
+          <ac:spMkLst>
+            <pc:docMk/>
+            <pc:sldMk cId="1838234662" sldId="267"/>
+            <ac:spMk id="2" creationId="{9C88504F-6773-F388-4F35-8C89B48CC8DB}"/>
+          </ac:spMkLst>
+        </pc:spChg>
+      </pc:sldChg>
       <pc:sldChg chg="new del">
         <pc:chgData name="Saulo Gil" userId="e4b858b1fb629067" providerId="LiveId" clId="{BD409E65-DA0C-4C99-81B5-98E95D8F4708}" dt="2024-03-12T17:53:47.102" v="211" actId="47"/>
         <pc:sldMkLst>
@@ -723,12 +835,66 @@
           <pc:sldMk cId="4151849934" sldId="267"/>
         </pc:sldMkLst>
       </pc:sldChg>
+      <pc:sldChg chg="addSp delSp modSp new del mod">
+        <pc:chgData name="Saulo Gil" userId="e4b858b1fb629067" providerId="LiveId" clId="{BD409E65-DA0C-4C99-81B5-98E95D8F4708}" dt="2024-03-13T17:41:50.810" v="376" actId="47"/>
+        <pc:sldMkLst>
+          <pc:docMk/>
+          <pc:sldMk cId="4280082678" sldId="267"/>
+        </pc:sldMkLst>
+        <pc:picChg chg="add">
+          <ac:chgData name="Saulo Gil" userId="e4b858b1fb629067" providerId="LiveId" clId="{BD409E65-DA0C-4C99-81B5-98E95D8F4708}" dt="2024-03-13T17:16:38.032" v="215"/>
+          <ac:picMkLst>
+            <pc:docMk/>
+            <pc:sldMk cId="4280082678" sldId="267"/>
+            <ac:picMk id="2" creationId="{3CFCF33F-45FE-0A06-2FEF-AEF3FEEED9F2}"/>
+          </ac:picMkLst>
+        </pc:picChg>
+        <pc:picChg chg="add del mod modCrop">
+          <ac:chgData name="Saulo Gil" userId="e4b858b1fb629067" providerId="LiveId" clId="{BD409E65-DA0C-4C99-81B5-98E95D8F4708}" dt="2024-03-13T17:18:46.551" v="225" actId="478"/>
+          <ac:picMkLst>
+            <pc:docMk/>
+            <pc:sldMk cId="4280082678" sldId="267"/>
+            <ac:picMk id="3" creationId="{4A064693-0843-6902-B7E6-3449194E6B42}"/>
+          </ac:picMkLst>
+        </pc:picChg>
+        <pc:picChg chg="add del mod modCrop">
+          <ac:chgData name="Saulo Gil" userId="e4b858b1fb629067" providerId="LiveId" clId="{BD409E65-DA0C-4C99-81B5-98E95D8F4708}" dt="2024-03-13T17:19:18.373" v="231" actId="478"/>
+          <ac:picMkLst>
+            <pc:docMk/>
+            <pc:sldMk cId="4280082678" sldId="267"/>
+            <ac:picMk id="4" creationId="{EBA488E0-A3A0-5FE4-1B93-82200F0B0242}"/>
+          </ac:picMkLst>
+        </pc:picChg>
+        <pc:picChg chg="add del mod modCrop">
+          <ac:chgData name="Saulo Gil" userId="e4b858b1fb629067" providerId="LiveId" clId="{BD409E65-DA0C-4C99-81B5-98E95D8F4708}" dt="2024-03-13T17:20:53.080" v="250" actId="478"/>
+          <ac:picMkLst>
+            <pc:docMk/>
+            <pc:sldMk cId="4280082678" sldId="267"/>
+            <ac:picMk id="5" creationId="{03EF9EE5-A922-9E4F-8D3E-FA9D2B6CDA62}"/>
+          </ac:picMkLst>
+        </pc:picChg>
+      </pc:sldChg>
       <pc:sldChg chg="del">
         <pc:chgData name="Saulo Gil" userId="e4b858b1fb629067" providerId="LiveId" clId="{BD409E65-DA0C-4C99-81B5-98E95D8F4708}" dt="2024-03-12T16:04:05.166" v="31" actId="47"/>
         <pc:sldMkLst>
           <pc:docMk/>
           <pc:sldMk cId="1990275769" sldId="268"/>
         </pc:sldMkLst>
+      </pc:sldChg>
+      <pc:sldChg chg="modSp add mod ord">
+        <pc:chgData name="Saulo Gil" userId="e4b858b1fb629067" providerId="LiveId" clId="{BD409E65-DA0C-4C99-81B5-98E95D8F4708}" dt="2024-03-13T17:42:31.813" v="405" actId="20577"/>
+        <pc:sldMkLst>
+          <pc:docMk/>
+          <pc:sldMk cId="2171584985" sldId="268"/>
+        </pc:sldMkLst>
+        <pc:spChg chg="mod">
+          <ac:chgData name="Saulo Gil" userId="e4b858b1fb629067" providerId="LiveId" clId="{BD409E65-DA0C-4C99-81B5-98E95D8F4708}" dt="2024-03-13T17:42:31.813" v="405" actId="20577"/>
+          <ac:spMkLst>
+            <pc:docMk/>
+            <pc:sldMk cId="2171584985" sldId="268"/>
+            <ac:spMk id="2" creationId="{9C88504F-6773-F388-4F35-8C89B48CC8DB}"/>
+          </ac:spMkLst>
+        </pc:spChg>
       </pc:sldChg>
       <pc:sldChg chg="add del">
         <pc:chgData name="Saulo Gil" userId="e4b858b1fb629067" providerId="LiveId" clId="{BD409E65-DA0C-4C99-81B5-98E95D8F4708}" dt="2024-03-12T17:53:47.102" v="211" actId="47"/>
@@ -1400,7 +1566,7 @@
           <a:p>
             <a:fld id="{A102AD8F-44E2-418A-8E72-7EA614DA287B}" type="datetimeFigureOut">
               <a:rPr lang="pt-BR" smtClean="0"/>
-              <a:t>12/03/2024</a:t>
+              <a:t>13/03/2024</a:t>
             </a:fld>
             <a:endParaRPr lang="pt-BR"/>
           </a:p>
@@ -1570,7 +1736,7 @@
           <a:p>
             <a:fld id="{A102AD8F-44E2-418A-8E72-7EA614DA287B}" type="datetimeFigureOut">
               <a:rPr lang="pt-BR" smtClean="0"/>
-              <a:t>12/03/2024</a:t>
+              <a:t>13/03/2024</a:t>
             </a:fld>
             <a:endParaRPr lang="pt-BR"/>
           </a:p>
@@ -1750,7 +1916,7 @@
           <a:p>
             <a:fld id="{A102AD8F-44E2-418A-8E72-7EA614DA287B}" type="datetimeFigureOut">
               <a:rPr lang="pt-BR" smtClean="0"/>
-              <a:t>12/03/2024</a:t>
+              <a:t>13/03/2024</a:t>
             </a:fld>
             <a:endParaRPr lang="pt-BR"/>
           </a:p>
@@ -1920,7 +2086,7 @@
           <a:p>
             <a:fld id="{A102AD8F-44E2-418A-8E72-7EA614DA287B}" type="datetimeFigureOut">
               <a:rPr lang="pt-BR" smtClean="0"/>
-              <a:t>12/03/2024</a:t>
+              <a:t>13/03/2024</a:t>
             </a:fld>
             <a:endParaRPr lang="pt-BR"/>
           </a:p>
@@ -2166,7 +2332,7 @@
           <a:p>
             <a:fld id="{A102AD8F-44E2-418A-8E72-7EA614DA287B}" type="datetimeFigureOut">
               <a:rPr lang="pt-BR" smtClean="0"/>
-              <a:t>12/03/2024</a:t>
+              <a:t>13/03/2024</a:t>
             </a:fld>
             <a:endParaRPr lang="pt-BR"/>
           </a:p>
@@ -2398,7 +2564,7 @@
           <a:p>
             <a:fld id="{A102AD8F-44E2-418A-8E72-7EA614DA287B}" type="datetimeFigureOut">
               <a:rPr lang="pt-BR" smtClean="0"/>
-              <a:t>12/03/2024</a:t>
+              <a:t>13/03/2024</a:t>
             </a:fld>
             <a:endParaRPr lang="pt-BR"/>
           </a:p>
@@ -2765,7 +2931,7 @@
           <a:p>
             <a:fld id="{A102AD8F-44E2-418A-8E72-7EA614DA287B}" type="datetimeFigureOut">
               <a:rPr lang="pt-BR" smtClean="0"/>
-              <a:t>12/03/2024</a:t>
+              <a:t>13/03/2024</a:t>
             </a:fld>
             <a:endParaRPr lang="pt-BR"/>
           </a:p>
@@ -2883,7 +3049,7 @@
           <a:p>
             <a:fld id="{A102AD8F-44E2-418A-8E72-7EA614DA287B}" type="datetimeFigureOut">
               <a:rPr lang="pt-BR" smtClean="0"/>
-              <a:t>12/03/2024</a:t>
+              <a:t>13/03/2024</a:t>
             </a:fld>
             <a:endParaRPr lang="pt-BR"/>
           </a:p>
@@ -2978,7 +3144,7 @@
           <a:p>
             <a:fld id="{A102AD8F-44E2-418A-8E72-7EA614DA287B}" type="datetimeFigureOut">
               <a:rPr lang="pt-BR" smtClean="0"/>
-              <a:t>12/03/2024</a:t>
+              <a:t>13/03/2024</a:t>
             </a:fld>
             <a:endParaRPr lang="pt-BR"/>
           </a:p>
@@ -3255,7 +3421,7 @@
           <a:p>
             <a:fld id="{A102AD8F-44E2-418A-8E72-7EA614DA287B}" type="datetimeFigureOut">
               <a:rPr lang="pt-BR" smtClean="0"/>
-              <a:t>12/03/2024</a:t>
+              <a:t>13/03/2024</a:t>
             </a:fld>
             <a:endParaRPr lang="pt-BR"/>
           </a:p>
@@ -3512,7 +3678,7 @@
           <a:p>
             <a:fld id="{A102AD8F-44E2-418A-8E72-7EA614DA287B}" type="datetimeFigureOut">
               <a:rPr lang="pt-BR" smtClean="0"/>
-              <a:t>12/03/2024</a:t>
+              <a:t>13/03/2024</a:t>
             </a:fld>
             <a:endParaRPr lang="pt-BR"/>
           </a:p>
@@ -3725,7 +3891,7 @@
           <a:p>
             <a:fld id="{A102AD8F-44E2-418A-8E72-7EA614DA287B}" type="datetimeFigureOut">
               <a:rPr lang="pt-BR" smtClean="0"/>
-              <a:t>12/03/2024</a:t>
+              <a:t>13/03/2024</a:t>
             </a:fld>
             <a:endParaRPr lang="pt-BR"/>
           </a:p>
@@ -4130,216 +4296,72 @@
           <a:chExt cx="0" cy="0"/>
         </a:xfrm>
       </p:grpSpPr>
-      <p:pic>
-        <p:nvPicPr>
-          <p:cNvPr id="10" name="Imagem 9">
+      <p:sp>
+        <p:nvSpPr>
+          <p:cNvPr id="2" name="CaixaDeTexto 1">
             <a:extLst>
               <a:ext uri="{FF2B5EF4-FFF2-40B4-BE49-F238E27FC236}">
-                <a16:creationId xmlns:a16="http://schemas.microsoft.com/office/drawing/2014/main" id="{8D919FD1-6B6D-903C-DB63-D85DFE4859C9}"/>
+                <a16:creationId xmlns:a16="http://schemas.microsoft.com/office/drawing/2014/main" id="{9C88504F-6773-F388-4F35-8C89B48CC8DB}"/>
               </a:ext>
             </a:extLst>
           </p:cNvPr>
-          <p:cNvPicPr>
-            <a:picLocks noChangeAspect="1"/>
-          </p:cNvPicPr>
+          <p:cNvSpPr txBox="1"/>
           <p:nvPr/>
-        </p:nvPicPr>
-        <p:blipFill>
-          <a:blip r:embed="rId2"/>
-          <a:stretch>
-            <a:fillRect/>
-          </a:stretch>
-        </p:blipFill>
+        </p:nvSpPr>
         <p:spPr>
           <a:xfrm>
-            <a:off x="-2207991" y="-11095892"/>
-            <a:ext cx="7461638" cy="6858000"/>
+            <a:off x="0" y="1520890"/>
+            <a:ext cx="9144000" cy="1569660"/>
           </a:xfrm>
           <a:prstGeom prst="rect">
             <a:avLst/>
           </a:prstGeom>
+          <a:noFill/>
         </p:spPr>
-      </p:pic>
-      <p:pic>
-        <p:nvPicPr>
-          <p:cNvPr id="11" name="Imagem 10">
-            <a:extLst>
-              <a:ext uri="{FF2B5EF4-FFF2-40B4-BE49-F238E27FC236}">
-                <a16:creationId xmlns:a16="http://schemas.microsoft.com/office/drawing/2014/main" id="{D227A22C-FC44-8E51-2D6E-820DE4F6219D}"/>
-              </a:ext>
-            </a:extLst>
-          </p:cNvPr>
-          <p:cNvPicPr>
-            <a:picLocks noChangeAspect="1"/>
-          </p:cNvPicPr>
-          <p:nvPr/>
-        </p:nvPicPr>
-        <p:blipFill>
-          <a:blip r:embed="rId3"/>
-          <a:stretch>
-            <a:fillRect/>
-          </a:stretch>
-        </p:blipFill>
-        <p:spPr>
-          <a:xfrm>
-            <a:off x="5253647" y="-11095892"/>
-            <a:ext cx="7461638" cy="6858000"/>
-          </a:xfrm>
-          <a:prstGeom prst="rect">
-            <a:avLst/>
-          </a:prstGeom>
-        </p:spPr>
-      </p:pic>
-      <p:pic>
-        <p:nvPicPr>
-          <p:cNvPr id="12" name="Imagem 11">
-            <a:extLst>
-              <a:ext uri="{FF2B5EF4-FFF2-40B4-BE49-F238E27FC236}">
-                <a16:creationId xmlns:a16="http://schemas.microsoft.com/office/drawing/2014/main" id="{76A567B2-09C5-A4C9-1275-418503FAB3D9}"/>
-              </a:ext>
-            </a:extLst>
-          </p:cNvPr>
-          <p:cNvPicPr>
-            <a:picLocks noChangeAspect="1"/>
-          </p:cNvPicPr>
-          <p:nvPr/>
-        </p:nvPicPr>
-        <p:blipFill>
-          <a:blip r:embed="rId4"/>
-          <a:stretch>
-            <a:fillRect/>
-          </a:stretch>
-        </p:blipFill>
-        <p:spPr>
-          <a:xfrm>
-            <a:off x="-2207991" y="-4237892"/>
-            <a:ext cx="7461638" cy="6858000"/>
-          </a:xfrm>
-          <a:prstGeom prst="rect">
-            <a:avLst/>
-          </a:prstGeom>
-        </p:spPr>
-      </p:pic>
-      <p:pic>
-        <p:nvPicPr>
-          <p:cNvPr id="13" name="Imagem 12">
-            <a:extLst>
-              <a:ext uri="{FF2B5EF4-FFF2-40B4-BE49-F238E27FC236}">
-                <a16:creationId xmlns:a16="http://schemas.microsoft.com/office/drawing/2014/main" id="{F2A0E9AF-B4FF-64FD-EE1E-46A8BADCD111}"/>
-              </a:ext>
-            </a:extLst>
-          </p:cNvPr>
-          <p:cNvPicPr>
-            <a:picLocks noChangeAspect="1"/>
-          </p:cNvPicPr>
-          <p:nvPr/>
-        </p:nvPicPr>
-        <p:blipFill>
-          <a:blip r:embed="rId5"/>
-          <a:stretch>
-            <a:fillRect/>
-          </a:stretch>
-        </p:blipFill>
-        <p:spPr>
-          <a:xfrm>
-            <a:off x="5253647" y="-4237892"/>
-            <a:ext cx="7461638" cy="6858000"/>
-          </a:xfrm>
-          <a:prstGeom prst="rect">
-            <a:avLst/>
-          </a:prstGeom>
-        </p:spPr>
-      </p:pic>
-      <p:pic>
-        <p:nvPicPr>
-          <p:cNvPr id="14" name="Imagem 13">
-            <a:extLst>
-              <a:ext uri="{FF2B5EF4-FFF2-40B4-BE49-F238E27FC236}">
-                <a16:creationId xmlns:a16="http://schemas.microsoft.com/office/drawing/2014/main" id="{2C2EE77F-6669-F312-233A-0AEFC39C0200}"/>
-              </a:ext>
-            </a:extLst>
-          </p:cNvPr>
-          <p:cNvPicPr>
-            <a:picLocks noChangeAspect="1"/>
-          </p:cNvPicPr>
-          <p:nvPr/>
-        </p:nvPicPr>
-        <p:blipFill>
-          <a:blip r:embed="rId6"/>
-          <a:stretch>
-            <a:fillRect/>
-          </a:stretch>
-        </p:blipFill>
-        <p:spPr>
-          <a:xfrm>
-            <a:off x="-2207991" y="2620108"/>
-            <a:ext cx="7461638" cy="6858000"/>
-          </a:xfrm>
-          <a:prstGeom prst="rect">
-            <a:avLst/>
-          </a:prstGeom>
-        </p:spPr>
-      </p:pic>
-      <p:pic>
-        <p:nvPicPr>
-          <p:cNvPr id="16" name="Imagem 15">
-            <a:extLst>
-              <a:ext uri="{FF2B5EF4-FFF2-40B4-BE49-F238E27FC236}">
-                <a16:creationId xmlns:a16="http://schemas.microsoft.com/office/drawing/2014/main" id="{2B0DAD7A-E08A-4EC5-6C0B-B8FA2B93890D}"/>
-              </a:ext>
-            </a:extLst>
-          </p:cNvPr>
-          <p:cNvPicPr>
-            <a:picLocks noChangeAspect="1"/>
-          </p:cNvPicPr>
-          <p:nvPr/>
-        </p:nvPicPr>
-        <p:blipFill>
-          <a:blip r:embed="rId7"/>
-          <a:stretch>
-            <a:fillRect/>
-          </a:stretch>
-        </p:blipFill>
-        <p:spPr>
-          <a:xfrm>
-            <a:off x="5253647" y="2620108"/>
-            <a:ext cx="7461638" cy="6858000"/>
-          </a:xfrm>
-          <a:prstGeom prst="rect">
-            <a:avLst/>
-          </a:prstGeom>
-        </p:spPr>
-      </p:pic>
-      <p:pic>
-        <p:nvPicPr>
-          <p:cNvPr id="17" name="Imagem 16">
-            <a:extLst>
-              <a:ext uri="{FF2B5EF4-FFF2-40B4-BE49-F238E27FC236}">
-                <a16:creationId xmlns:a16="http://schemas.microsoft.com/office/drawing/2014/main" id="{D025171D-24D4-67AD-A85C-A348DBF70F30}"/>
-              </a:ext>
-            </a:extLst>
-          </p:cNvPr>
-          <p:cNvPicPr>
-            <a:picLocks noChangeAspect="1"/>
-          </p:cNvPicPr>
-          <p:nvPr/>
-        </p:nvPicPr>
-        <p:blipFill>
-          <a:blip r:embed="rId8"/>
-          <a:stretch>
-            <a:fillRect/>
-          </a:stretch>
-        </p:blipFill>
-        <p:spPr>
-          <a:xfrm>
-            <a:off x="-2207991" y="9478108"/>
-            <a:ext cx="7461638" cy="6858000"/>
-          </a:xfrm>
-          <a:prstGeom prst="rect">
-            <a:avLst/>
-          </a:prstGeom>
-        </p:spPr>
-      </p:pic>
+        <p:txBody>
+          <a:bodyPr wrap="square" rtlCol="0">
+            <a:spAutoFit/>
+          </a:bodyPr>
+          <a:lstStyle/>
+          <a:p>
+            <a:pPr algn="ctr"/>
+            <a:r>
+              <a:rPr lang="pt-BR" sz="9600" b="1" dirty="0"/>
+              <a:t>ESTUDO 1</a:t>
+            </a:r>
+          </a:p>
+        </p:txBody>
+      </p:sp>
+    </p:spTree>
+    <p:extLst>
+      <p:ext uri="{BB962C8B-B14F-4D97-AF65-F5344CB8AC3E}">
+        <p14:creationId xmlns:p14="http://schemas.microsoft.com/office/powerpoint/2010/main" val="1838234662"/>
+      </p:ext>
+    </p:extLst>
+  </p:cSld>
+  <p:clrMapOvr>
+    <a:masterClrMapping/>
+  </p:clrMapOvr>
+</p:sld>
+</file>
+
+<file path=ppt/slides/slide2.xml><?xml version="1.0" encoding="utf-8"?>
+<p:sld xmlns:a="http://schemas.openxmlformats.org/drawingml/2006/main" xmlns:r="http://schemas.openxmlformats.org/officeDocument/2006/relationships" xmlns:p="http://schemas.openxmlformats.org/presentationml/2006/main">
+  <p:cSld>
+    <p:spTree>
+      <p:nvGrpSpPr>
+        <p:cNvPr id="1" name=""/>
+        <p:cNvGrpSpPr/>
+        <p:nvPr/>
+      </p:nvGrpSpPr>
+      <p:grpSpPr>
+        <a:xfrm>
+          <a:off x="0" y="0"/>
+          <a:ext cx="0" cy="0"/>
+          <a:chOff x="0" y="0"/>
+          <a:chExt cx="0" cy="0"/>
+        </a:xfrm>
+      </p:grpSpPr>
       <p:sp>
         <p:nvSpPr>
           <p:cNvPr id="4" name="Retângulo 3">
@@ -4388,16 +4410,226 @@
           <a:lstStyle/>
           <a:p>
             <a:pPr algn="ctr"/>
-            <a:endParaRPr lang="pt-BR"/>
+            <a:endParaRPr lang="pt-BR" dirty="0"/>
           </a:p>
         </p:txBody>
       </p:sp>
       <p:pic>
         <p:nvPicPr>
-          <p:cNvPr id="18" name="Imagem 17">
+          <p:cNvPr id="2" name="Imagem 1">
             <a:extLst>
               <a:ext uri="{FF2B5EF4-FFF2-40B4-BE49-F238E27FC236}">
-                <a16:creationId xmlns:a16="http://schemas.microsoft.com/office/drawing/2014/main" id="{62B74169-9CDC-A97C-375C-9F3FBAC3450F}"/>
+                <a16:creationId xmlns:a16="http://schemas.microsoft.com/office/drawing/2014/main" id="{3FDC1E89-898E-73FF-429B-C110FC3E2CE7}"/>
+              </a:ext>
+            </a:extLst>
+          </p:cNvPr>
+          <p:cNvPicPr>
+            <a:picLocks noChangeAspect="1"/>
+          </p:cNvPicPr>
+          <p:nvPr/>
+        </p:nvPicPr>
+        <p:blipFill>
+          <a:blip r:embed="rId2"/>
+          <a:stretch>
+            <a:fillRect/>
+          </a:stretch>
+        </p:blipFill>
+        <p:spPr>
+          <a:xfrm>
+            <a:off x="-2207991" y="-11095892"/>
+            <a:ext cx="7436487" cy="6858000"/>
+          </a:xfrm>
+          <a:prstGeom prst="rect">
+            <a:avLst/>
+          </a:prstGeom>
+        </p:spPr>
+      </p:pic>
+      <p:pic>
+        <p:nvPicPr>
+          <p:cNvPr id="5" name="Imagem 4">
+            <a:extLst>
+              <a:ext uri="{FF2B5EF4-FFF2-40B4-BE49-F238E27FC236}">
+                <a16:creationId xmlns:a16="http://schemas.microsoft.com/office/drawing/2014/main" id="{F12DB447-3D92-049E-D31D-6FF979102FB4}"/>
+              </a:ext>
+            </a:extLst>
+          </p:cNvPr>
+          <p:cNvPicPr>
+            <a:picLocks noChangeAspect="1"/>
+          </p:cNvPicPr>
+          <p:nvPr/>
+        </p:nvPicPr>
+        <p:blipFill>
+          <a:blip r:embed="rId3"/>
+          <a:stretch>
+            <a:fillRect/>
+          </a:stretch>
+        </p:blipFill>
+        <p:spPr>
+          <a:xfrm>
+            <a:off x="5230370" y="-11095893"/>
+            <a:ext cx="7436487" cy="6858000"/>
+          </a:xfrm>
+          <a:prstGeom prst="rect">
+            <a:avLst/>
+          </a:prstGeom>
+        </p:spPr>
+      </p:pic>
+      <p:pic>
+        <p:nvPicPr>
+          <p:cNvPr id="6" name="Imagem 5">
+            <a:extLst>
+              <a:ext uri="{FF2B5EF4-FFF2-40B4-BE49-F238E27FC236}">
+                <a16:creationId xmlns:a16="http://schemas.microsoft.com/office/drawing/2014/main" id="{5AF94036-AAE3-3BEB-418E-E282D2155485}"/>
+              </a:ext>
+            </a:extLst>
+          </p:cNvPr>
+          <p:cNvPicPr>
+            <a:picLocks noChangeAspect="1"/>
+          </p:cNvPicPr>
+          <p:nvPr/>
+        </p:nvPicPr>
+        <p:blipFill>
+          <a:blip r:embed="rId4"/>
+          <a:stretch>
+            <a:fillRect/>
+          </a:stretch>
+        </p:blipFill>
+        <p:spPr>
+          <a:xfrm>
+            <a:off x="-2214775" y="-4237893"/>
+            <a:ext cx="7436487" cy="6858000"/>
+          </a:xfrm>
+          <a:prstGeom prst="rect">
+            <a:avLst/>
+          </a:prstGeom>
+        </p:spPr>
+      </p:pic>
+      <p:pic>
+        <p:nvPicPr>
+          <p:cNvPr id="7" name="Imagem 6">
+            <a:extLst>
+              <a:ext uri="{FF2B5EF4-FFF2-40B4-BE49-F238E27FC236}">
+                <a16:creationId xmlns:a16="http://schemas.microsoft.com/office/drawing/2014/main" id="{77DEA35D-E2D3-C882-FAB6-46E917D65EE0}"/>
+              </a:ext>
+            </a:extLst>
+          </p:cNvPr>
+          <p:cNvPicPr>
+            <a:picLocks noChangeAspect="1"/>
+          </p:cNvPicPr>
+          <p:nvPr/>
+        </p:nvPicPr>
+        <p:blipFill>
+          <a:blip r:embed="rId5"/>
+          <a:stretch>
+            <a:fillRect/>
+          </a:stretch>
+        </p:blipFill>
+        <p:spPr>
+          <a:xfrm>
+            <a:off x="5221915" y="-4237893"/>
+            <a:ext cx="7436487" cy="6858000"/>
+          </a:xfrm>
+          <a:prstGeom prst="rect">
+            <a:avLst/>
+          </a:prstGeom>
+        </p:spPr>
+      </p:pic>
+      <p:pic>
+        <p:nvPicPr>
+          <p:cNvPr id="8" name="Imagem 7">
+            <a:extLst>
+              <a:ext uri="{FF2B5EF4-FFF2-40B4-BE49-F238E27FC236}">
+                <a16:creationId xmlns:a16="http://schemas.microsoft.com/office/drawing/2014/main" id="{5C014F31-A146-B561-AFDF-4208F5769FC5}"/>
+              </a:ext>
+            </a:extLst>
+          </p:cNvPr>
+          <p:cNvPicPr>
+            <a:picLocks noChangeAspect="1"/>
+          </p:cNvPicPr>
+          <p:nvPr/>
+        </p:nvPicPr>
+        <p:blipFill>
+          <a:blip r:embed="rId6"/>
+          <a:stretch>
+            <a:fillRect/>
+          </a:stretch>
+        </p:blipFill>
+        <p:spPr>
+          <a:xfrm>
+            <a:off x="-2206921" y="2620108"/>
+            <a:ext cx="7436487" cy="6858000"/>
+          </a:xfrm>
+          <a:prstGeom prst="rect">
+            <a:avLst/>
+          </a:prstGeom>
+        </p:spPr>
+      </p:pic>
+      <p:pic>
+        <p:nvPicPr>
+          <p:cNvPr id="9" name="Imagem 8">
+            <a:extLst>
+              <a:ext uri="{FF2B5EF4-FFF2-40B4-BE49-F238E27FC236}">
+                <a16:creationId xmlns:a16="http://schemas.microsoft.com/office/drawing/2014/main" id="{3071FA86-1280-434B-2A00-BA0FDC3FF487}"/>
+              </a:ext>
+            </a:extLst>
+          </p:cNvPr>
+          <p:cNvPicPr>
+            <a:picLocks noChangeAspect="1"/>
+          </p:cNvPicPr>
+          <p:nvPr/>
+        </p:nvPicPr>
+        <p:blipFill>
+          <a:blip r:embed="rId7"/>
+          <a:stretch>
+            <a:fillRect/>
+          </a:stretch>
+        </p:blipFill>
+        <p:spPr>
+          <a:xfrm>
+            <a:off x="5225731" y="2620108"/>
+            <a:ext cx="7436487" cy="6858000"/>
+          </a:xfrm>
+          <a:prstGeom prst="rect">
+            <a:avLst/>
+          </a:prstGeom>
+        </p:spPr>
+      </p:pic>
+      <p:pic>
+        <p:nvPicPr>
+          <p:cNvPr id="15" name="Imagem 14">
+            <a:extLst>
+              <a:ext uri="{FF2B5EF4-FFF2-40B4-BE49-F238E27FC236}">
+                <a16:creationId xmlns:a16="http://schemas.microsoft.com/office/drawing/2014/main" id="{672A3D43-D3B1-85B4-24F2-36953BD56F95}"/>
+              </a:ext>
+            </a:extLst>
+          </p:cNvPr>
+          <p:cNvPicPr>
+            <a:picLocks noChangeAspect="1"/>
+          </p:cNvPicPr>
+          <p:nvPr/>
+        </p:nvPicPr>
+        <p:blipFill>
+          <a:blip r:embed="rId8"/>
+          <a:stretch>
+            <a:fillRect/>
+          </a:stretch>
+        </p:blipFill>
+        <p:spPr>
+          <a:xfrm>
+            <a:off x="-2203889" y="9478108"/>
+            <a:ext cx="7436487" cy="6858000"/>
+          </a:xfrm>
+          <a:prstGeom prst="rect">
+            <a:avLst/>
+          </a:prstGeom>
+        </p:spPr>
+      </p:pic>
+      <p:pic>
+        <p:nvPicPr>
+          <p:cNvPr id="21" name="Imagem 20">
+            <a:extLst>
+              <a:ext uri="{FF2B5EF4-FFF2-40B4-BE49-F238E27FC236}">
+                <a16:creationId xmlns:a16="http://schemas.microsoft.com/office/drawing/2014/main" id="{31BBCC00-D2E4-612A-35D9-FD5B342C5F2F}"/>
               </a:ext>
             </a:extLst>
           </p:cNvPr>
@@ -4414,8 +4646,8 @@
         </p:blipFill>
         <p:spPr>
           <a:xfrm>
-            <a:off x="5253647" y="9478108"/>
-            <a:ext cx="7461638" cy="6858000"/>
+            <a:off x="5225731" y="9478108"/>
+            <a:ext cx="7436487" cy="6858000"/>
           </a:xfrm>
           <a:prstGeom prst="rect">
             <a:avLst/>
@@ -4424,10 +4656,10 @@
       </p:pic>
       <p:pic>
         <p:nvPicPr>
-          <p:cNvPr id="19" name="Imagem 18">
+          <p:cNvPr id="22" name="Imagem 21">
             <a:extLst>
               <a:ext uri="{FF2B5EF4-FFF2-40B4-BE49-F238E27FC236}">
-                <a16:creationId xmlns:a16="http://schemas.microsoft.com/office/drawing/2014/main" id="{8313F395-974B-B1CD-2936-84C998255592}"/>
+                <a16:creationId xmlns:a16="http://schemas.microsoft.com/office/drawing/2014/main" id="{9B312BA5-246D-5A0C-522D-1D76EE1E39BE}"/>
               </a:ext>
             </a:extLst>
           </p:cNvPr>
@@ -4444,8 +4676,8 @@
         </p:blipFill>
         <p:spPr>
           <a:xfrm>
-            <a:off x="-2207991" y="16336108"/>
-            <a:ext cx="7461638" cy="6858000"/>
+            <a:off x="-2198386" y="16336108"/>
+            <a:ext cx="7436487" cy="6858000"/>
           </a:xfrm>
           <a:prstGeom prst="rect">
             <a:avLst/>
@@ -4454,10 +4686,10 @@
       </p:pic>
       <p:pic>
         <p:nvPicPr>
-          <p:cNvPr id="20" name="Imagem 19">
+          <p:cNvPr id="23" name="Imagem 22">
             <a:extLst>
               <a:ext uri="{FF2B5EF4-FFF2-40B4-BE49-F238E27FC236}">
-                <a16:creationId xmlns:a16="http://schemas.microsoft.com/office/drawing/2014/main" id="{8A3659E5-B1AD-1F31-F675-81EF4063E3E3}"/>
+                <a16:creationId xmlns:a16="http://schemas.microsoft.com/office/drawing/2014/main" id="{7160DC83-F864-F4A7-8A15-DF159570D1DB}"/>
               </a:ext>
             </a:extLst>
           </p:cNvPr>
@@ -4474,8 +4706,8 @@
         </p:blipFill>
         <p:spPr>
           <a:xfrm>
-            <a:off x="5253647" y="16336108"/>
-            <a:ext cx="7461638" cy="6858000"/>
+            <a:off x="5235256" y="16336108"/>
+            <a:ext cx="7436487" cy="6858000"/>
           </a:xfrm>
           <a:prstGeom prst="rect">
             <a:avLst/>
@@ -4484,10 +4716,10 @@
       </p:pic>
       <p:pic>
         <p:nvPicPr>
-          <p:cNvPr id="3" name="Imagem 2">
+          <p:cNvPr id="24" name="Imagem 23">
             <a:extLst>
               <a:ext uri="{FF2B5EF4-FFF2-40B4-BE49-F238E27FC236}">
-                <a16:creationId xmlns:a16="http://schemas.microsoft.com/office/drawing/2014/main" id="{9DBA6E72-F42D-8E09-EA77-EBA5999FC8EF}"/>
+                <a16:creationId xmlns:a16="http://schemas.microsoft.com/office/drawing/2014/main" id="{908B4967-6650-216E-5C68-EEDE51699F3A}"/>
               </a:ext>
             </a:extLst>
           </p:cNvPr>
@@ -4498,13 +4730,13 @@
         </p:nvPicPr>
         <p:blipFill rotWithShape="1">
           <a:blip r:embed="rId12"/>
-          <a:srcRect t="6168" b="84444"/>
+          <a:srcRect t="5843" b="87255"/>
           <a:stretch/>
         </p:blipFill>
         <p:spPr>
           <a:xfrm>
-            <a:off x="1682362" y="-11739704"/>
-            <a:ext cx="7461638" cy="643812"/>
+            <a:off x="1707513" y="-11654467"/>
+            <a:ext cx="7436487" cy="473337"/>
           </a:xfrm>
           <a:prstGeom prst="rect">
             <a:avLst/>
@@ -4524,7 +4756,7 @@
 </p:sld>
 </file>
 
-<file path=ppt/slides/slide2.xml><?xml version="1.0" encoding="utf-8"?>
+<file path=ppt/slides/slide3.xml><?xml version="1.0" encoding="utf-8"?>
 <p:sld xmlns:a="http://schemas.openxmlformats.org/drawingml/2006/main" xmlns:r="http://schemas.openxmlformats.org/officeDocument/2006/relationships" xmlns:p="http://schemas.openxmlformats.org/presentationml/2006/main">
   <p:cSld>
     <p:spTree>
@@ -4541,339 +4773,46 @@
           <a:chExt cx="0" cy="0"/>
         </a:xfrm>
       </p:grpSpPr>
-      <p:pic>
-        <p:nvPicPr>
-          <p:cNvPr id="10" name="Imagem 9">
+      <p:sp>
+        <p:nvSpPr>
+          <p:cNvPr id="2" name="CaixaDeTexto 1">
             <a:extLst>
               <a:ext uri="{FF2B5EF4-FFF2-40B4-BE49-F238E27FC236}">
-                <a16:creationId xmlns:a16="http://schemas.microsoft.com/office/drawing/2014/main" id="{8D919FD1-6B6D-903C-DB63-D85DFE4859C9}"/>
+                <a16:creationId xmlns:a16="http://schemas.microsoft.com/office/drawing/2014/main" id="{9C88504F-6773-F388-4F35-8C89B48CC8DB}"/>
               </a:ext>
             </a:extLst>
           </p:cNvPr>
-          <p:cNvPicPr>
-            <a:picLocks noChangeAspect="1"/>
-          </p:cNvPicPr>
+          <p:cNvSpPr txBox="1"/>
           <p:nvPr/>
-        </p:nvPicPr>
-        <p:blipFill>
-          <a:blip r:embed="rId2"/>
-          <a:stretch>
-            <a:fillRect/>
-          </a:stretch>
-        </p:blipFill>
+        </p:nvSpPr>
         <p:spPr>
           <a:xfrm>
-            <a:off x="-14186631" y="-4237892"/>
-            <a:ext cx="7461638" cy="6858000"/>
+            <a:off x="0" y="1520890"/>
+            <a:ext cx="9144000" cy="1569660"/>
           </a:xfrm>
           <a:prstGeom prst="rect">
             <a:avLst/>
           </a:prstGeom>
+          <a:noFill/>
         </p:spPr>
-      </p:pic>
-      <p:pic>
-        <p:nvPicPr>
-          <p:cNvPr id="11" name="Imagem 10">
-            <a:extLst>
-              <a:ext uri="{FF2B5EF4-FFF2-40B4-BE49-F238E27FC236}">
-                <a16:creationId xmlns:a16="http://schemas.microsoft.com/office/drawing/2014/main" id="{D227A22C-FC44-8E51-2D6E-820DE4F6219D}"/>
-              </a:ext>
-            </a:extLst>
-          </p:cNvPr>
-          <p:cNvPicPr>
-            <a:picLocks noChangeAspect="1"/>
-          </p:cNvPicPr>
-          <p:nvPr/>
-        </p:nvPicPr>
-        <p:blipFill>
-          <a:blip r:embed="rId3"/>
-          <a:stretch>
-            <a:fillRect/>
-          </a:stretch>
-        </p:blipFill>
-        <p:spPr>
-          <a:xfrm>
-            <a:off x="-6724993" y="-4237892"/>
-            <a:ext cx="7461638" cy="6858000"/>
-          </a:xfrm>
-          <a:prstGeom prst="rect">
-            <a:avLst/>
-          </a:prstGeom>
-        </p:spPr>
-      </p:pic>
-      <p:pic>
-        <p:nvPicPr>
-          <p:cNvPr id="12" name="Imagem 11">
-            <a:extLst>
-              <a:ext uri="{FF2B5EF4-FFF2-40B4-BE49-F238E27FC236}">
-                <a16:creationId xmlns:a16="http://schemas.microsoft.com/office/drawing/2014/main" id="{76A567B2-09C5-A4C9-1275-418503FAB3D9}"/>
-              </a:ext>
-            </a:extLst>
-          </p:cNvPr>
-          <p:cNvPicPr>
-            <a:picLocks noChangeAspect="1"/>
-          </p:cNvPicPr>
-          <p:nvPr/>
-        </p:nvPicPr>
-        <p:blipFill>
-          <a:blip r:embed="rId4"/>
-          <a:stretch>
-            <a:fillRect/>
-          </a:stretch>
-        </p:blipFill>
-        <p:spPr>
-          <a:xfrm>
-            <a:off x="736645" y="-4237892"/>
-            <a:ext cx="7461638" cy="6858000"/>
-          </a:xfrm>
-          <a:prstGeom prst="rect">
-            <a:avLst/>
-          </a:prstGeom>
-        </p:spPr>
-      </p:pic>
-      <p:pic>
-        <p:nvPicPr>
-          <p:cNvPr id="13" name="Imagem 12">
-            <a:extLst>
-              <a:ext uri="{FF2B5EF4-FFF2-40B4-BE49-F238E27FC236}">
-                <a16:creationId xmlns:a16="http://schemas.microsoft.com/office/drawing/2014/main" id="{F2A0E9AF-B4FF-64FD-EE1E-46A8BADCD111}"/>
-              </a:ext>
-            </a:extLst>
-          </p:cNvPr>
-          <p:cNvPicPr>
-            <a:picLocks noChangeAspect="1"/>
-          </p:cNvPicPr>
-          <p:nvPr/>
-        </p:nvPicPr>
-        <p:blipFill>
-          <a:blip r:embed="rId5"/>
-          <a:stretch>
-            <a:fillRect/>
-          </a:stretch>
-        </p:blipFill>
-        <p:spPr>
-          <a:xfrm>
-            <a:off x="8198283" y="-4237892"/>
-            <a:ext cx="7461638" cy="6858000"/>
-          </a:xfrm>
-          <a:prstGeom prst="rect">
-            <a:avLst/>
-          </a:prstGeom>
-        </p:spPr>
-      </p:pic>
-      <p:pic>
-        <p:nvPicPr>
-          <p:cNvPr id="14" name="Imagem 13">
-            <a:extLst>
-              <a:ext uri="{FF2B5EF4-FFF2-40B4-BE49-F238E27FC236}">
-                <a16:creationId xmlns:a16="http://schemas.microsoft.com/office/drawing/2014/main" id="{2C2EE77F-6669-F312-233A-0AEFC39C0200}"/>
-              </a:ext>
-            </a:extLst>
-          </p:cNvPr>
-          <p:cNvPicPr>
-            <a:picLocks noChangeAspect="1"/>
-          </p:cNvPicPr>
-          <p:nvPr/>
-        </p:nvPicPr>
-        <p:blipFill>
-          <a:blip r:embed="rId6"/>
-          <a:stretch>
-            <a:fillRect/>
-          </a:stretch>
-        </p:blipFill>
-        <p:spPr>
-          <a:xfrm>
-            <a:off x="15659921" y="-4237892"/>
-            <a:ext cx="7461638" cy="6858000"/>
-          </a:xfrm>
-          <a:prstGeom prst="rect">
-            <a:avLst/>
-          </a:prstGeom>
-        </p:spPr>
-      </p:pic>
-      <p:pic>
-        <p:nvPicPr>
-          <p:cNvPr id="16" name="Imagem 15">
-            <a:extLst>
-              <a:ext uri="{FF2B5EF4-FFF2-40B4-BE49-F238E27FC236}">
-                <a16:creationId xmlns:a16="http://schemas.microsoft.com/office/drawing/2014/main" id="{2B0DAD7A-E08A-4EC5-6C0B-B8FA2B93890D}"/>
-              </a:ext>
-            </a:extLst>
-          </p:cNvPr>
-          <p:cNvPicPr>
-            <a:picLocks noChangeAspect="1"/>
-          </p:cNvPicPr>
-          <p:nvPr/>
-        </p:nvPicPr>
-        <p:blipFill>
-          <a:blip r:embed="rId7"/>
-          <a:stretch>
-            <a:fillRect/>
-          </a:stretch>
-        </p:blipFill>
-        <p:spPr>
-          <a:xfrm>
-            <a:off x="-14186631" y="2620108"/>
-            <a:ext cx="7461638" cy="6858000"/>
-          </a:xfrm>
-          <a:prstGeom prst="rect">
-            <a:avLst/>
-          </a:prstGeom>
-        </p:spPr>
-      </p:pic>
-      <p:pic>
-        <p:nvPicPr>
-          <p:cNvPr id="17" name="Imagem 16">
-            <a:extLst>
-              <a:ext uri="{FF2B5EF4-FFF2-40B4-BE49-F238E27FC236}">
-                <a16:creationId xmlns:a16="http://schemas.microsoft.com/office/drawing/2014/main" id="{D025171D-24D4-67AD-A85C-A348DBF70F30}"/>
-              </a:ext>
-            </a:extLst>
-          </p:cNvPr>
-          <p:cNvPicPr>
-            <a:picLocks noChangeAspect="1"/>
-          </p:cNvPicPr>
-          <p:nvPr/>
-        </p:nvPicPr>
-        <p:blipFill>
-          <a:blip r:embed="rId8"/>
-          <a:stretch>
-            <a:fillRect/>
-          </a:stretch>
-        </p:blipFill>
-        <p:spPr>
-          <a:xfrm>
-            <a:off x="-6724993" y="2620108"/>
-            <a:ext cx="7461638" cy="6858000"/>
-          </a:xfrm>
-          <a:prstGeom prst="rect">
-            <a:avLst/>
-          </a:prstGeom>
-        </p:spPr>
-      </p:pic>
-      <p:pic>
-        <p:nvPicPr>
-          <p:cNvPr id="18" name="Imagem 17">
-            <a:extLst>
-              <a:ext uri="{FF2B5EF4-FFF2-40B4-BE49-F238E27FC236}">
-                <a16:creationId xmlns:a16="http://schemas.microsoft.com/office/drawing/2014/main" id="{62B74169-9CDC-A97C-375C-9F3FBAC3450F}"/>
-              </a:ext>
-            </a:extLst>
-          </p:cNvPr>
-          <p:cNvPicPr>
-            <a:picLocks noChangeAspect="1"/>
-          </p:cNvPicPr>
-          <p:nvPr/>
-        </p:nvPicPr>
-        <p:blipFill>
-          <a:blip r:embed="rId9"/>
-          <a:stretch>
-            <a:fillRect/>
-          </a:stretch>
-        </p:blipFill>
-        <p:spPr>
-          <a:xfrm>
-            <a:off x="736645" y="2620108"/>
-            <a:ext cx="7461638" cy="6858000"/>
-          </a:xfrm>
-          <a:prstGeom prst="rect">
-            <a:avLst/>
-          </a:prstGeom>
-        </p:spPr>
-      </p:pic>
-      <p:pic>
-        <p:nvPicPr>
-          <p:cNvPr id="19" name="Imagem 18">
-            <a:extLst>
-              <a:ext uri="{FF2B5EF4-FFF2-40B4-BE49-F238E27FC236}">
-                <a16:creationId xmlns:a16="http://schemas.microsoft.com/office/drawing/2014/main" id="{8313F395-974B-B1CD-2936-84C998255592}"/>
-              </a:ext>
-            </a:extLst>
-          </p:cNvPr>
-          <p:cNvPicPr>
-            <a:picLocks noChangeAspect="1"/>
-          </p:cNvPicPr>
-          <p:nvPr/>
-        </p:nvPicPr>
-        <p:blipFill>
-          <a:blip r:embed="rId10"/>
-          <a:stretch>
-            <a:fillRect/>
-          </a:stretch>
-        </p:blipFill>
-        <p:spPr>
-          <a:xfrm>
-            <a:off x="8198283" y="2620108"/>
-            <a:ext cx="7461638" cy="6858000"/>
-          </a:xfrm>
-          <a:prstGeom prst="rect">
-            <a:avLst/>
-          </a:prstGeom>
-        </p:spPr>
-      </p:pic>
-      <p:pic>
-        <p:nvPicPr>
-          <p:cNvPr id="20" name="Imagem 19">
-            <a:extLst>
-              <a:ext uri="{FF2B5EF4-FFF2-40B4-BE49-F238E27FC236}">
-                <a16:creationId xmlns:a16="http://schemas.microsoft.com/office/drawing/2014/main" id="{8A3659E5-B1AD-1F31-F675-81EF4063E3E3}"/>
-              </a:ext>
-            </a:extLst>
-          </p:cNvPr>
-          <p:cNvPicPr>
-            <a:picLocks noChangeAspect="1"/>
-          </p:cNvPicPr>
-          <p:nvPr/>
-        </p:nvPicPr>
-        <p:blipFill>
-          <a:blip r:embed="rId11"/>
-          <a:stretch>
-            <a:fillRect/>
-          </a:stretch>
-        </p:blipFill>
-        <p:spPr>
-          <a:xfrm>
-            <a:off x="15659921" y="2620108"/>
-            <a:ext cx="7461638" cy="6858000"/>
-          </a:xfrm>
-          <a:prstGeom prst="rect">
-            <a:avLst/>
-          </a:prstGeom>
-        </p:spPr>
-      </p:pic>
-      <p:pic>
-        <p:nvPicPr>
-          <p:cNvPr id="21" name="Imagem 20">
-            <a:extLst>
-              <a:ext uri="{FF2B5EF4-FFF2-40B4-BE49-F238E27FC236}">
-                <a16:creationId xmlns:a16="http://schemas.microsoft.com/office/drawing/2014/main" id="{BE2B8D6F-4EA0-F075-5CD6-5B9E06BAAEE4}"/>
-              </a:ext>
-            </a:extLst>
-          </p:cNvPr>
-          <p:cNvPicPr>
-            <a:picLocks noChangeAspect="1"/>
-          </p:cNvPicPr>
-          <p:nvPr/>
-        </p:nvPicPr>
-        <p:blipFill rotWithShape="1">
-          <a:blip r:embed="rId12"/>
-          <a:srcRect t="6168" b="84444"/>
-          <a:stretch/>
-        </p:blipFill>
-        <p:spPr>
-          <a:xfrm>
-            <a:off x="736645" y="-4881704"/>
-            <a:ext cx="7461638" cy="643812"/>
-          </a:xfrm>
-          <a:prstGeom prst="rect">
-            <a:avLst/>
-          </a:prstGeom>
-        </p:spPr>
-      </p:pic>
+        <p:txBody>
+          <a:bodyPr wrap="square" rtlCol="0">
+            <a:spAutoFit/>
+          </a:bodyPr>
+          <a:lstStyle/>
+          <a:p>
+            <a:pPr algn="ctr"/>
+            <a:r>
+              <a:rPr lang="pt-BR" sz="9600" b="1" dirty="0"/>
+              <a:t>ESTUDO 2</a:t>
+            </a:r>
+          </a:p>
+        </p:txBody>
+      </p:sp>
     </p:spTree>
     <p:extLst>
       <p:ext uri="{BB962C8B-B14F-4D97-AF65-F5344CB8AC3E}">
-        <p14:creationId xmlns:p14="http://schemas.microsoft.com/office/powerpoint/2010/main" val="1513017753"/>
+        <p14:creationId xmlns:p14="http://schemas.microsoft.com/office/powerpoint/2010/main" val="2171584985"/>
       </p:ext>
     </p:extLst>
   </p:cSld>

</xml_diff>

<commit_message>
bubble plot study 2
</commit_message>
<xml_diff>
--- a/bubleplots.pptx
+++ b/bubleplots.pptx
@@ -8,6 +8,8 @@
     <p:sldId id="267" r:id="rId2"/>
     <p:sldId id="266" r:id="rId3"/>
     <p:sldId id="268" r:id="rId4"/>
+    <p:sldId id="269" r:id="rId5"/>
+    <p:sldId id="270" r:id="rId6"/>
   </p:sldIdLst>
   <p:sldSz cx="9144000" cy="6858000" type="screen4x3"/>
   <p:notesSz cx="6858000" cy="9144000"/>
@@ -117,7 +119,7 @@
 <file path=ppt/revisionInfo.xml><?xml version="1.0" encoding="utf-8"?>
 <p1510:revInfo xmlns:a="http://schemas.openxmlformats.org/drawingml/2006/main" xmlns:r="http://schemas.openxmlformats.org/officeDocument/2006/relationships" xmlns:p1510="http://schemas.microsoft.com/office/powerpoint/2015/10/main">
   <p1510:revLst>
-    <p1510:client id="{BD409E65-DA0C-4C99-81B5-98E95D8F4708}" v="109" dt="2024-03-13T17:42:28.395"/>
+    <p1510:client id="{BD409E65-DA0C-4C99-81B5-98E95D8F4708}" v="144" dt="2024-03-13T19:01:16.853"/>
   </p1510:revLst>
 </p1510:revInfo>
 </file>
@@ -127,7 +129,7 @@
   <pc:docChgLst>
     <pc:chgData name="Saulo Gil" userId="e4b858b1fb629067" providerId="LiveId" clId="{BD409E65-DA0C-4C99-81B5-98E95D8F4708}"/>
     <pc:docChg chg="undo custSel addSld delSld modSld sldOrd modMainMaster">
-      <pc:chgData name="Saulo Gil" userId="e4b858b1fb629067" providerId="LiveId" clId="{BD409E65-DA0C-4C99-81B5-98E95D8F4708}" dt="2024-03-13T17:42:31.813" v="405" actId="20577"/>
+      <pc:chgData name="Saulo Gil" userId="e4b858b1fb629067" providerId="LiveId" clId="{BD409E65-DA0C-4C99-81B5-98E95D8F4708}" dt="2024-03-13T19:01:50.152" v="727" actId="1076"/>
       <pc:docMkLst>
         <pc:docMk/>
       </pc:docMkLst>
@@ -910,6 +912,189 @@
           <pc:sldMk cId="882543340" sldId="269"/>
         </pc:sldMkLst>
       </pc:sldChg>
+      <pc:sldChg chg="addSp delSp modSp new mod">
+        <pc:chgData name="Saulo Gil" userId="e4b858b1fb629067" providerId="LiveId" clId="{BD409E65-DA0C-4C99-81B5-98E95D8F4708}" dt="2024-03-13T19:01:26.150" v="726" actId="1076"/>
+        <pc:sldMkLst>
+          <pc:docMk/>
+          <pc:sldMk cId="2143358719" sldId="269"/>
+        </pc:sldMkLst>
+        <pc:spChg chg="add mod">
+          <ac:chgData name="Saulo Gil" userId="e4b858b1fb629067" providerId="LiveId" clId="{BD409E65-DA0C-4C99-81B5-98E95D8F4708}" dt="2024-03-13T18:52:48.638" v="513" actId="14100"/>
+          <ac:spMkLst>
+            <pc:docMk/>
+            <pc:sldMk cId="2143358719" sldId="269"/>
+            <ac:spMk id="21" creationId="{D7099157-9C02-7BE1-0EEE-8F47317E820F}"/>
+          </ac:spMkLst>
+        </pc:spChg>
+        <pc:picChg chg="add del">
+          <ac:chgData name="Saulo Gil" userId="e4b858b1fb629067" providerId="LiveId" clId="{BD409E65-DA0C-4C99-81B5-98E95D8F4708}" dt="2024-03-13T18:31:29.866" v="410" actId="478"/>
+          <ac:picMkLst>
+            <pc:docMk/>
+            <pc:sldMk cId="2143358719" sldId="269"/>
+            <ac:picMk id="2" creationId="{CCD5449D-A670-E923-7E98-5871FEFF695A}"/>
+          </ac:picMkLst>
+        </pc:picChg>
+        <pc:picChg chg="add del mod">
+          <ac:chgData name="Saulo Gil" userId="e4b858b1fb629067" providerId="LiveId" clId="{BD409E65-DA0C-4C99-81B5-98E95D8F4708}" dt="2024-03-13T18:32:49.496" v="416" actId="478"/>
+          <ac:picMkLst>
+            <pc:docMk/>
+            <pc:sldMk cId="2143358719" sldId="269"/>
+            <ac:picMk id="3" creationId="{B7B886B3-081F-309D-4E27-10AEDAE23C75}"/>
+          </ac:picMkLst>
+        </pc:picChg>
+        <pc:picChg chg="add del mod ord">
+          <ac:chgData name="Saulo Gil" userId="e4b858b1fb629067" providerId="LiveId" clId="{BD409E65-DA0C-4C99-81B5-98E95D8F4708}" dt="2024-03-13T18:44:22.951" v="470" actId="478"/>
+          <ac:picMkLst>
+            <pc:docMk/>
+            <pc:sldMk cId="2143358719" sldId="269"/>
+            <ac:picMk id="4" creationId="{65763D57-9F89-2009-6946-68C6A8BF1A7B}"/>
+          </ac:picMkLst>
+        </pc:picChg>
+        <pc:picChg chg="add del mod">
+          <ac:chgData name="Saulo Gil" userId="e4b858b1fb629067" providerId="LiveId" clId="{BD409E65-DA0C-4C99-81B5-98E95D8F4708}" dt="2024-03-13T18:44:22.336" v="469" actId="478"/>
+          <ac:picMkLst>
+            <pc:docMk/>
+            <pc:sldMk cId="2143358719" sldId="269"/>
+            <ac:picMk id="5" creationId="{6B5678A3-718A-9889-5E0C-70E079886850}"/>
+          </ac:picMkLst>
+        </pc:picChg>
+        <pc:picChg chg="add del mod">
+          <ac:chgData name="Saulo Gil" userId="e4b858b1fb629067" providerId="LiveId" clId="{BD409E65-DA0C-4C99-81B5-98E95D8F4708}" dt="2024-03-13T18:34:24.048" v="425" actId="478"/>
+          <ac:picMkLst>
+            <pc:docMk/>
+            <pc:sldMk cId="2143358719" sldId="269"/>
+            <ac:picMk id="6" creationId="{3A0BD307-01D2-4A41-E60E-5BCCFD28A721}"/>
+          </ac:picMkLst>
+        </pc:picChg>
+        <pc:picChg chg="add del mod">
+          <ac:chgData name="Saulo Gil" userId="e4b858b1fb629067" providerId="LiveId" clId="{BD409E65-DA0C-4C99-81B5-98E95D8F4708}" dt="2024-03-13T18:44:21.615" v="468" actId="478"/>
+          <ac:picMkLst>
+            <pc:docMk/>
+            <pc:sldMk cId="2143358719" sldId="269"/>
+            <ac:picMk id="7" creationId="{445C77B9-E407-69A8-13DE-2D9C652B457A}"/>
+          </ac:picMkLst>
+        </pc:picChg>
+        <pc:picChg chg="add del mod">
+          <ac:chgData name="Saulo Gil" userId="e4b858b1fb629067" providerId="LiveId" clId="{BD409E65-DA0C-4C99-81B5-98E95D8F4708}" dt="2024-03-13T18:44:20.759" v="467" actId="478"/>
+          <ac:picMkLst>
+            <pc:docMk/>
+            <pc:sldMk cId="2143358719" sldId="269"/>
+            <ac:picMk id="8" creationId="{0C368CD1-B0A2-A341-C24C-FCADB2B2B0E0}"/>
+          </ac:picMkLst>
+        </pc:picChg>
+        <pc:picChg chg="add del mod">
+          <ac:chgData name="Saulo Gil" userId="e4b858b1fb629067" providerId="LiveId" clId="{BD409E65-DA0C-4C99-81B5-98E95D8F4708}" dt="2024-03-13T18:38:25.214" v="447" actId="478"/>
+          <ac:picMkLst>
+            <pc:docMk/>
+            <pc:sldMk cId="2143358719" sldId="269"/>
+            <ac:picMk id="9" creationId="{57B863FB-C4F9-35FC-22A4-CC7AF36E66EA}"/>
+          </ac:picMkLst>
+        </pc:picChg>
+        <pc:picChg chg="add del mod">
+          <ac:chgData name="Saulo Gil" userId="e4b858b1fb629067" providerId="LiveId" clId="{BD409E65-DA0C-4C99-81B5-98E95D8F4708}" dt="2024-03-13T18:44:19.549" v="466" actId="478"/>
+          <ac:picMkLst>
+            <pc:docMk/>
+            <pc:sldMk cId="2143358719" sldId="269"/>
+            <ac:picMk id="10" creationId="{9FC36103-2A5B-43D1-B6AB-3044A1C7B7FC}"/>
+          </ac:picMkLst>
+        </pc:picChg>
+        <pc:picChg chg="add del mod">
+          <ac:chgData name="Saulo Gil" userId="e4b858b1fb629067" providerId="LiveId" clId="{BD409E65-DA0C-4C99-81B5-98E95D8F4708}" dt="2024-03-13T18:44:19.062" v="465" actId="478"/>
+          <ac:picMkLst>
+            <pc:docMk/>
+            <pc:sldMk cId="2143358719" sldId="269"/>
+            <ac:picMk id="11" creationId="{78D67127-28AC-5DB2-E2E2-B2D9414273DF}"/>
+          </ac:picMkLst>
+        </pc:picChg>
+        <pc:picChg chg="add del mod">
+          <ac:chgData name="Saulo Gil" userId="e4b858b1fb629067" providerId="LiveId" clId="{BD409E65-DA0C-4C99-81B5-98E95D8F4708}" dt="2024-03-13T18:44:18.592" v="464" actId="478"/>
+          <ac:picMkLst>
+            <pc:docMk/>
+            <pc:sldMk cId="2143358719" sldId="269"/>
+            <ac:picMk id="12" creationId="{A096E5D5-20D1-B766-5296-5AC20EF31AAD}"/>
+          </ac:picMkLst>
+        </pc:picChg>
+        <pc:picChg chg="add mod">
+          <ac:chgData name="Saulo Gil" userId="e4b858b1fb629067" providerId="LiveId" clId="{BD409E65-DA0C-4C99-81B5-98E95D8F4708}" dt="2024-03-13T18:47:53.326" v="493" actId="1076"/>
+          <ac:picMkLst>
+            <pc:docMk/>
+            <pc:sldMk cId="2143358719" sldId="269"/>
+            <ac:picMk id="13" creationId="{107DD2B0-8EA5-E7A4-B1F2-A262C063714D}"/>
+          </ac:picMkLst>
+        </pc:picChg>
+        <pc:picChg chg="add mod">
+          <ac:chgData name="Saulo Gil" userId="e4b858b1fb629067" providerId="LiveId" clId="{BD409E65-DA0C-4C99-81B5-98E95D8F4708}" dt="2024-03-13T18:47:53.326" v="493" actId="1076"/>
+          <ac:picMkLst>
+            <pc:docMk/>
+            <pc:sldMk cId="2143358719" sldId="269"/>
+            <ac:picMk id="14" creationId="{CB7C9C9C-FE2F-BC6A-2C62-5356334E93A8}"/>
+          </ac:picMkLst>
+        </pc:picChg>
+        <pc:picChg chg="add mod">
+          <ac:chgData name="Saulo Gil" userId="e4b858b1fb629067" providerId="LiveId" clId="{BD409E65-DA0C-4C99-81B5-98E95D8F4708}" dt="2024-03-13T18:47:53.326" v="493" actId="1076"/>
+          <ac:picMkLst>
+            <pc:docMk/>
+            <pc:sldMk cId="2143358719" sldId="269"/>
+            <ac:picMk id="15" creationId="{B2FA022B-BAB0-C7E6-B41E-BA38714066E6}"/>
+          </ac:picMkLst>
+        </pc:picChg>
+        <pc:picChg chg="add mod">
+          <ac:chgData name="Saulo Gil" userId="e4b858b1fb629067" providerId="LiveId" clId="{BD409E65-DA0C-4C99-81B5-98E95D8F4708}" dt="2024-03-13T18:48:22.629" v="497" actId="1076"/>
+          <ac:picMkLst>
+            <pc:docMk/>
+            <pc:sldMk cId="2143358719" sldId="269"/>
+            <ac:picMk id="16" creationId="{BDF767ED-CBAA-623C-B415-EFE76A8E4754}"/>
+          </ac:picMkLst>
+        </pc:picChg>
+        <pc:picChg chg="add mod">
+          <ac:chgData name="Saulo Gil" userId="e4b858b1fb629067" providerId="LiveId" clId="{BD409E65-DA0C-4C99-81B5-98E95D8F4708}" dt="2024-03-13T18:47:53.326" v="493" actId="1076"/>
+          <ac:picMkLst>
+            <pc:docMk/>
+            <pc:sldMk cId="2143358719" sldId="269"/>
+            <ac:picMk id="17" creationId="{3C9D2C4D-148C-F31C-7387-3FD26F07E99D}"/>
+          </ac:picMkLst>
+        </pc:picChg>
+        <pc:picChg chg="add mod">
+          <ac:chgData name="Saulo Gil" userId="e4b858b1fb629067" providerId="LiveId" clId="{BD409E65-DA0C-4C99-81B5-98E95D8F4708}" dt="2024-03-13T18:47:53.326" v="493" actId="1076"/>
+          <ac:picMkLst>
+            <pc:docMk/>
+            <pc:sldMk cId="2143358719" sldId="269"/>
+            <ac:picMk id="18" creationId="{E9A8B223-B55D-18F9-EF99-3264E9AC5ED3}"/>
+          </ac:picMkLst>
+        </pc:picChg>
+        <pc:picChg chg="add mod">
+          <ac:chgData name="Saulo Gil" userId="e4b858b1fb629067" providerId="LiveId" clId="{BD409E65-DA0C-4C99-81B5-98E95D8F4708}" dt="2024-03-13T18:47:53.326" v="493" actId="1076"/>
+          <ac:picMkLst>
+            <pc:docMk/>
+            <pc:sldMk cId="2143358719" sldId="269"/>
+            <ac:picMk id="19" creationId="{BCB6AEB6-C854-6EE5-00F4-1628DC7FF003}"/>
+          </ac:picMkLst>
+        </pc:picChg>
+        <pc:picChg chg="add mod">
+          <ac:chgData name="Saulo Gil" userId="e4b858b1fb629067" providerId="LiveId" clId="{BD409E65-DA0C-4C99-81B5-98E95D8F4708}" dt="2024-03-13T18:47:53.326" v="493" actId="1076"/>
+          <ac:picMkLst>
+            <pc:docMk/>
+            <pc:sldMk cId="2143358719" sldId="269"/>
+            <ac:picMk id="20" creationId="{78A640CF-9EA0-20B9-337F-91172C1BF061}"/>
+          </ac:picMkLst>
+        </pc:picChg>
+        <pc:picChg chg="add del mod">
+          <ac:chgData name="Saulo Gil" userId="e4b858b1fb629067" providerId="LiveId" clId="{BD409E65-DA0C-4C99-81B5-98E95D8F4708}" dt="2024-03-13T19:01:19.079" v="725" actId="478"/>
+          <ac:picMkLst>
+            <pc:docMk/>
+            <pc:sldMk cId="2143358719" sldId="269"/>
+            <ac:picMk id="23" creationId="{D0798093-92A6-64C7-EED5-3A2F8D550B6B}"/>
+          </ac:picMkLst>
+        </pc:picChg>
+        <pc:picChg chg="add mod">
+          <ac:chgData name="Saulo Gil" userId="e4b858b1fb629067" providerId="LiveId" clId="{BD409E65-DA0C-4C99-81B5-98E95D8F4708}" dt="2024-03-13T19:01:26.150" v="726" actId="1076"/>
+          <ac:picMkLst>
+            <pc:docMk/>
+            <pc:sldMk cId="2143358719" sldId="269"/>
+            <ac:picMk id="24" creationId="{389AFAEC-0542-FC9F-491E-3E51C7A668FC}"/>
+          </ac:picMkLst>
+        </pc:picChg>
+      </pc:sldChg>
       <pc:sldChg chg="new add del">
         <pc:chgData name="Saulo Gil" userId="e4b858b1fb629067" providerId="LiveId" clId="{BD409E65-DA0C-4C99-81B5-98E95D8F4708}" dt="2024-03-12T16:04:05.166" v="31" actId="47"/>
         <pc:sldMkLst>
@@ -923,6 +1108,164 @@
           <pc:docMk/>
           <pc:sldMk cId="85130287" sldId="270"/>
         </pc:sldMkLst>
+      </pc:sldChg>
+      <pc:sldChg chg="addSp delSp modSp new del mod">
+        <pc:chgData name="Saulo Gil" userId="e4b858b1fb629067" providerId="LiveId" clId="{BD409E65-DA0C-4C99-81B5-98E95D8F4708}" dt="2024-03-13T18:54:06.693" v="527" actId="2696"/>
+        <pc:sldMkLst>
+          <pc:docMk/>
+          <pc:sldMk cId="433489146" sldId="270"/>
+        </pc:sldMkLst>
+        <pc:picChg chg="add del mod modCrop">
+          <ac:chgData name="Saulo Gil" userId="e4b858b1fb629067" providerId="LiveId" clId="{BD409E65-DA0C-4C99-81B5-98E95D8F4708}" dt="2024-03-13T18:53:14.377" v="520" actId="478"/>
+          <ac:picMkLst>
+            <pc:docMk/>
+            <pc:sldMk cId="433489146" sldId="270"/>
+            <ac:picMk id="3" creationId="{9840FA56-0E84-380C-4203-6F8CDC1C8B8B}"/>
+          </ac:picMkLst>
+        </pc:picChg>
+        <pc:picChg chg="add mod modCrop">
+          <ac:chgData name="Saulo Gil" userId="e4b858b1fb629067" providerId="LiveId" clId="{BD409E65-DA0C-4C99-81B5-98E95D8F4708}" dt="2024-03-13T18:51:27.887" v="503" actId="732"/>
+          <ac:picMkLst>
+            <pc:docMk/>
+            <pc:sldMk cId="433489146" sldId="270"/>
+            <ac:picMk id="4" creationId="{CAB44893-774A-F8B6-9F78-013122B911AD}"/>
+          </ac:picMkLst>
+        </pc:picChg>
+        <pc:picChg chg="add mod modCrop">
+          <ac:chgData name="Saulo Gil" userId="e4b858b1fb629067" providerId="LiveId" clId="{BD409E65-DA0C-4C99-81B5-98E95D8F4708}" dt="2024-03-13T18:53:09.366" v="514" actId="1076"/>
+          <ac:picMkLst>
+            <pc:docMk/>
+            <pc:sldMk cId="433489146" sldId="270"/>
+            <ac:picMk id="5" creationId="{F1E39C06-DA76-4244-42A9-EA00F92752B6}"/>
+          </ac:picMkLst>
+        </pc:picChg>
+        <pc:picChg chg="add mod">
+          <ac:chgData name="Saulo Gil" userId="e4b858b1fb629067" providerId="LiveId" clId="{BD409E65-DA0C-4C99-81B5-98E95D8F4708}" dt="2024-03-13T18:53:10.654" v="515"/>
+          <ac:picMkLst>
+            <pc:docMk/>
+            <pc:sldMk cId="433489146" sldId="270"/>
+            <ac:picMk id="6" creationId="{BE3ECE28-2302-E08F-7D47-5CE0BAD7B707}"/>
+          </ac:picMkLst>
+        </pc:picChg>
+        <pc:picChg chg="add mod">
+          <ac:chgData name="Saulo Gil" userId="e4b858b1fb629067" providerId="LiveId" clId="{BD409E65-DA0C-4C99-81B5-98E95D8F4708}" dt="2024-03-13T18:53:11.687" v="516"/>
+          <ac:picMkLst>
+            <pc:docMk/>
+            <pc:sldMk cId="433489146" sldId="270"/>
+            <ac:picMk id="7" creationId="{82FAEFBA-C465-1081-E8A6-3B40418D944E}"/>
+          </ac:picMkLst>
+        </pc:picChg>
+        <pc:picChg chg="add mod">
+          <ac:chgData name="Saulo Gil" userId="e4b858b1fb629067" providerId="LiveId" clId="{BD409E65-DA0C-4C99-81B5-98E95D8F4708}" dt="2024-03-13T18:53:12.326" v="517"/>
+          <ac:picMkLst>
+            <pc:docMk/>
+            <pc:sldMk cId="433489146" sldId="270"/>
+            <ac:picMk id="8" creationId="{49FBE09B-F984-270C-53A8-F4D1675FDD69}"/>
+          </ac:picMkLst>
+        </pc:picChg>
+        <pc:picChg chg="add mod modCrop">
+          <ac:chgData name="Saulo Gil" userId="e4b858b1fb629067" providerId="LiveId" clId="{BD409E65-DA0C-4C99-81B5-98E95D8F4708}" dt="2024-03-13T18:53:42.927" v="526" actId="1076"/>
+          <ac:picMkLst>
+            <pc:docMk/>
+            <pc:sldMk cId="433489146" sldId="270"/>
+            <ac:picMk id="9" creationId="{DAF63E3B-89BD-852C-E574-50BECD68ABEA}"/>
+          </ac:picMkLst>
+        </pc:picChg>
+        <pc:picChg chg="add mod modCrop">
+          <ac:chgData name="Saulo Gil" userId="e4b858b1fb629067" providerId="LiveId" clId="{BD409E65-DA0C-4C99-81B5-98E95D8F4708}" dt="2024-03-13T18:53:39.397" v="525" actId="1076"/>
+          <ac:picMkLst>
+            <pc:docMk/>
+            <pc:sldMk cId="433489146" sldId="270"/>
+            <ac:picMk id="10" creationId="{074173E4-5C41-A1BC-B3E9-19FD9CB5E3E7}"/>
+          </ac:picMkLst>
+        </pc:picChg>
+      </pc:sldChg>
+      <pc:sldChg chg="addSp delSp modSp new mod">
+        <pc:chgData name="Saulo Gil" userId="e4b858b1fb629067" providerId="LiveId" clId="{BD409E65-DA0C-4C99-81B5-98E95D8F4708}" dt="2024-03-13T19:01:50.152" v="727" actId="1076"/>
+        <pc:sldMkLst>
+          <pc:docMk/>
+          <pc:sldMk cId="898400793" sldId="270"/>
+        </pc:sldMkLst>
+        <pc:picChg chg="add mod modCrop">
+          <ac:chgData name="Saulo Gil" userId="e4b858b1fb629067" providerId="LiveId" clId="{BD409E65-DA0C-4C99-81B5-98E95D8F4708}" dt="2024-03-13T19:01:50.152" v="727" actId="1076"/>
+          <ac:picMkLst>
+            <pc:docMk/>
+            <pc:sldMk cId="898400793" sldId="270"/>
+            <ac:picMk id="3" creationId="{753E5990-D118-21BD-92C4-8B15A6526E61}"/>
+          </ac:picMkLst>
+        </pc:picChg>
+        <pc:picChg chg="add mod modCrop">
+          <ac:chgData name="Saulo Gil" userId="e4b858b1fb629067" providerId="LiveId" clId="{BD409E65-DA0C-4C99-81B5-98E95D8F4708}" dt="2024-03-13T19:01:50.152" v="727" actId="1076"/>
+          <ac:picMkLst>
+            <pc:docMk/>
+            <pc:sldMk cId="898400793" sldId="270"/>
+            <ac:picMk id="4" creationId="{5BA6182E-57C7-78B3-7480-732434A62254}"/>
+          </ac:picMkLst>
+        </pc:picChg>
+        <pc:picChg chg="add mod modCrop">
+          <ac:chgData name="Saulo Gil" userId="e4b858b1fb629067" providerId="LiveId" clId="{BD409E65-DA0C-4C99-81B5-98E95D8F4708}" dt="2024-03-13T19:01:50.152" v="727" actId="1076"/>
+          <ac:picMkLst>
+            <pc:docMk/>
+            <pc:sldMk cId="898400793" sldId="270"/>
+            <ac:picMk id="5" creationId="{63747EEC-0E58-87DE-3590-31B1694CB435}"/>
+          </ac:picMkLst>
+        </pc:picChg>
+        <pc:picChg chg="add mod modCrop">
+          <ac:chgData name="Saulo Gil" userId="e4b858b1fb629067" providerId="LiveId" clId="{BD409E65-DA0C-4C99-81B5-98E95D8F4708}" dt="2024-03-13T19:01:50.152" v="727" actId="1076"/>
+          <ac:picMkLst>
+            <pc:docMk/>
+            <pc:sldMk cId="898400793" sldId="270"/>
+            <ac:picMk id="6" creationId="{524CB9C1-D3D5-0472-3572-574AAC700466}"/>
+          </ac:picMkLst>
+        </pc:picChg>
+        <pc:picChg chg="add mod modCrop">
+          <ac:chgData name="Saulo Gil" userId="e4b858b1fb629067" providerId="LiveId" clId="{BD409E65-DA0C-4C99-81B5-98E95D8F4708}" dt="2024-03-13T19:01:50.152" v="727" actId="1076"/>
+          <ac:picMkLst>
+            <pc:docMk/>
+            <pc:sldMk cId="898400793" sldId="270"/>
+            <ac:picMk id="7" creationId="{E51C25A6-1AD1-5A5E-3966-D1F2D474DE6F}"/>
+          </ac:picMkLst>
+        </pc:picChg>
+        <pc:picChg chg="add mod modCrop">
+          <ac:chgData name="Saulo Gil" userId="e4b858b1fb629067" providerId="LiveId" clId="{BD409E65-DA0C-4C99-81B5-98E95D8F4708}" dt="2024-03-13T19:01:50.152" v="727" actId="1076"/>
+          <ac:picMkLst>
+            <pc:docMk/>
+            <pc:sldMk cId="898400793" sldId="270"/>
+            <ac:picMk id="8" creationId="{CBD8D491-EAD1-8A81-E2C1-3363BDCE857C}"/>
+          </ac:picMkLst>
+        </pc:picChg>
+        <pc:picChg chg="add mod modCrop">
+          <ac:chgData name="Saulo Gil" userId="e4b858b1fb629067" providerId="LiveId" clId="{BD409E65-DA0C-4C99-81B5-98E95D8F4708}" dt="2024-03-13T19:01:50.152" v="727" actId="1076"/>
+          <ac:picMkLst>
+            <pc:docMk/>
+            <pc:sldMk cId="898400793" sldId="270"/>
+            <ac:picMk id="9" creationId="{E791C74A-25B6-51FF-E5F6-90CFDF304F41}"/>
+          </ac:picMkLst>
+        </pc:picChg>
+        <pc:picChg chg="add mod ord">
+          <ac:chgData name="Saulo Gil" userId="e4b858b1fb629067" providerId="LiveId" clId="{BD409E65-DA0C-4C99-81B5-98E95D8F4708}" dt="2024-03-13T19:01:50.152" v="727" actId="1076"/>
+          <ac:picMkLst>
+            <pc:docMk/>
+            <pc:sldMk cId="898400793" sldId="270"/>
+            <ac:picMk id="13" creationId="{A3581821-C6CC-4608-EB45-2B6DAB905C42}"/>
+          </ac:picMkLst>
+        </pc:picChg>
+        <pc:picChg chg="add del mod">
+          <ac:chgData name="Saulo Gil" userId="e4b858b1fb629067" providerId="LiveId" clId="{BD409E65-DA0C-4C99-81B5-98E95D8F4708}" dt="2024-03-13T19:01:11.036" v="723" actId="21"/>
+          <ac:picMkLst>
+            <pc:docMk/>
+            <pc:sldMk cId="898400793" sldId="270"/>
+            <ac:picMk id="14" creationId="{389AFAEC-0542-FC9F-491E-3E51C7A668FC}"/>
+          </ac:picMkLst>
+        </pc:picChg>
+        <pc:cxnChg chg="add del mod">
+          <ac:chgData name="Saulo Gil" userId="e4b858b1fb629067" providerId="LiveId" clId="{BD409E65-DA0C-4C99-81B5-98E95D8F4708}" dt="2024-03-13T19:00:40.313" v="702" actId="478"/>
+          <ac:cxnSpMkLst>
+            <pc:docMk/>
+            <pc:sldMk cId="898400793" sldId="270"/>
+            <ac:cxnSpMk id="11" creationId="{EE576159-4C79-1031-EBB4-1881F663F530}"/>
+          </ac:cxnSpMkLst>
+        </pc:cxnChg>
       </pc:sldChg>
       <pc:sldChg chg="addSp modSp add del mod setBg">
         <pc:chgData name="Saulo Gil" userId="e4b858b1fb629067" providerId="LiveId" clId="{BD409E65-DA0C-4C99-81B5-98E95D8F4708}" dt="2024-03-12T16:04:05.166" v="31" actId="47"/>
@@ -4822,6 +5165,621 @@
 </p:sld>
 </file>
 
+<file path=ppt/slides/slide4.xml><?xml version="1.0" encoding="utf-8"?>
+<p:sld xmlns:a="http://schemas.openxmlformats.org/drawingml/2006/main" xmlns:r="http://schemas.openxmlformats.org/officeDocument/2006/relationships" xmlns:p="http://schemas.openxmlformats.org/presentationml/2006/main">
+  <p:cSld>
+    <p:spTree>
+      <p:nvGrpSpPr>
+        <p:cNvPr id="1" name=""/>
+        <p:cNvGrpSpPr/>
+        <p:nvPr/>
+      </p:nvGrpSpPr>
+      <p:grpSpPr>
+        <a:xfrm>
+          <a:off x="0" y="0"/>
+          <a:ext cx="0" cy="0"/>
+          <a:chOff x="0" y="0"/>
+          <a:chExt cx="0" cy="0"/>
+        </a:xfrm>
+      </p:grpSpPr>
+      <p:pic>
+        <p:nvPicPr>
+          <p:cNvPr id="13" name="Imagem 12">
+            <a:extLst>
+              <a:ext uri="{FF2B5EF4-FFF2-40B4-BE49-F238E27FC236}">
+                <a16:creationId xmlns:a16="http://schemas.microsoft.com/office/drawing/2014/main" id="{107DD2B0-8EA5-E7A4-B1F2-A262C063714D}"/>
+              </a:ext>
+            </a:extLst>
+          </p:cNvPr>
+          <p:cNvPicPr>
+            <a:picLocks noChangeAspect="1"/>
+          </p:cNvPicPr>
+          <p:nvPr/>
+        </p:nvPicPr>
+        <p:blipFill>
+          <a:blip r:embed="rId2"/>
+          <a:stretch>
+            <a:fillRect/>
+          </a:stretch>
+        </p:blipFill>
+        <p:spPr>
+          <a:xfrm>
+            <a:off x="-3718244" y="-9144000"/>
+            <a:ext cx="7436487" cy="6858000"/>
+          </a:xfrm>
+          <a:prstGeom prst="rect">
+            <a:avLst/>
+          </a:prstGeom>
+        </p:spPr>
+      </p:pic>
+      <p:pic>
+        <p:nvPicPr>
+          <p:cNvPr id="14" name="Imagem 13">
+            <a:extLst>
+              <a:ext uri="{FF2B5EF4-FFF2-40B4-BE49-F238E27FC236}">
+                <a16:creationId xmlns:a16="http://schemas.microsoft.com/office/drawing/2014/main" id="{CB7C9C9C-FE2F-BC6A-2C62-5356334E93A8}"/>
+              </a:ext>
+            </a:extLst>
+          </p:cNvPr>
+          <p:cNvPicPr>
+            <a:picLocks noChangeAspect="1"/>
+          </p:cNvPicPr>
+          <p:nvPr/>
+        </p:nvPicPr>
+        <p:blipFill>
+          <a:blip r:embed="rId3"/>
+          <a:stretch>
+            <a:fillRect/>
+          </a:stretch>
+        </p:blipFill>
+        <p:spPr>
+          <a:xfrm>
+            <a:off x="3718243" y="-9144000"/>
+            <a:ext cx="7436487" cy="6858000"/>
+          </a:xfrm>
+          <a:prstGeom prst="rect">
+            <a:avLst/>
+          </a:prstGeom>
+        </p:spPr>
+      </p:pic>
+      <p:pic>
+        <p:nvPicPr>
+          <p:cNvPr id="15" name="Imagem 14">
+            <a:extLst>
+              <a:ext uri="{FF2B5EF4-FFF2-40B4-BE49-F238E27FC236}">
+                <a16:creationId xmlns:a16="http://schemas.microsoft.com/office/drawing/2014/main" id="{B2FA022B-BAB0-C7E6-B41E-BA38714066E6}"/>
+              </a:ext>
+            </a:extLst>
+          </p:cNvPr>
+          <p:cNvPicPr>
+            <a:picLocks noChangeAspect="1"/>
+          </p:cNvPicPr>
+          <p:nvPr/>
+        </p:nvPicPr>
+        <p:blipFill>
+          <a:blip r:embed="rId4"/>
+          <a:stretch>
+            <a:fillRect/>
+          </a:stretch>
+        </p:blipFill>
+        <p:spPr>
+          <a:xfrm>
+            <a:off x="-3718244" y="-2286000"/>
+            <a:ext cx="7436487" cy="6858000"/>
+          </a:xfrm>
+          <a:prstGeom prst="rect">
+            <a:avLst/>
+          </a:prstGeom>
+        </p:spPr>
+      </p:pic>
+      <p:pic>
+        <p:nvPicPr>
+          <p:cNvPr id="16" name="Imagem 15">
+            <a:extLst>
+              <a:ext uri="{FF2B5EF4-FFF2-40B4-BE49-F238E27FC236}">
+                <a16:creationId xmlns:a16="http://schemas.microsoft.com/office/drawing/2014/main" id="{BDF767ED-CBAA-623C-B415-EFE76A8E4754}"/>
+              </a:ext>
+            </a:extLst>
+          </p:cNvPr>
+          <p:cNvPicPr>
+            <a:picLocks noChangeAspect="1"/>
+          </p:cNvPicPr>
+          <p:nvPr/>
+        </p:nvPicPr>
+        <p:blipFill>
+          <a:blip r:embed="rId5"/>
+          <a:stretch>
+            <a:fillRect/>
+          </a:stretch>
+        </p:blipFill>
+        <p:spPr>
+          <a:xfrm>
+            <a:off x="3718243" y="-2286000"/>
+            <a:ext cx="7436487" cy="6858000"/>
+          </a:xfrm>
+          <a:prstGeom prst="rect">
+            <a:avLst/>
+          </a:prstGeom>
+        </p:spPr>
+      </p:pic>
+      <p:pic>
+        <p:nvPicPr>
+          <p:cNvPr id="17" name="Imagem 16">
+            <a:extLst>
+              <a:ext uri="{FF2B5EF4-FFF2-40B4-BE49-F238E27FC236}">
+                <a16:creationId xmlns:a16="http://schemas.microsoft.com/office/drawing/2014/main" id="{3C9D2C4D-148C-F31C-7387-3FD26F07E99D}"/>
+              </a:ext>
+            </a:extLst>
+          </p:cNvPr>
+          <p:cNvPicPr>
+            <a:picLocks noChangeAspect="1"/>
+          </p:cNvPicPr>
+          <p:nvPr/>
+        </p:nvPicPr>
+        <p:blipFill>
+          <a:blip r:embed="rId6"/>
+          <a:stretch>
+            <a:fillRect/>
+          </a:stretch>
+        </p:blipFill>
+        <p:spPr>
+          <a:xfrm>
+            <a:off x="-3718244" y="4572000"/>
+            <a:ext cx="7436487" cy="6858000"/>
+          </a:xfrm>
+          <a:prstGeom prst="rect">
+            <a:avLst/>
+          </a:prstGeom>
+        </p:spPr>
+      </p:pic>
+      <p:pic>
+        <p:nvPicPr>
+          <p:cNvPr id="18" name="Imagem 17">
+            <a:extLst>
+              <a:ext uri="{FF2B5EF4-FFF2-40B4-BE49-F238E27FC236}">
+                <a16:creationId xmlns:a16="http://schemas.microsoft.com/office/drawing/2014/main" id="{E9A8B223-B55D-18F9-EF99-3264E9AC5ED3}"/>
+              </a:ext>
+            </a:extLst>
+          </p:cNvPr>
+          <p:cNvPicPr>
+            <a:picLocks noChangeAspect="1"/>
+          </p:cNvPicPr>
+          <p:nvPr/>
+        </p:nvPicPr>
+        <p:blipFill>
+          <a:blip r:embed="rId7"/>
+          <a:stretch>
+            <a:fillRect/>
+          </a:stretch>
+        </p:blipFill>
+        <p:spPr>
+          <a:xfrm>
+            <a:off x="3718243" y="4572000"/>
+            <a:ext cx="7436487" cy="6858000"/>
+          </a:xfrm>
+          <a:prstGeom prst="rect">
+            <a:avLst/>
+          </a:prstGeom>
+        </p:spPr>
+      </p:pic>
+      <p:pic>
+        <p:nvPicPr>
+          <p:cNvPr id="19" name="Imagem 18">
+            <a:extLst>
+              <a:ext uri="{FF2B5EF4-FFF2-40B4-BE49-F238E27FC236}">
+                <a16:creationId xmlns:a16="http://schemas.microsoft.com/office/drawing/2014/main" id="{BCB6AEB6-C854-6EE5-00F4-1628DC7FF003}"/>
+              </a:ext>
+            </a:extLst>
+          </p:cNvPr>
+          <p:cNvPicPr>
+            <a:picLocks noChangeAspect="1"/>
+          </p:cNvPicPr>
+          <p:nvPr/>
+        </p:nvPicPr>
+        <p:blipFill>
+          <a:blip r:embed="rId8"/>
+          <a:stretch>
+            <a:fillRect/>
+          </a:stretch>
+        </p:blipFill>
+        <p:spPr>
+          <a:xfrm>
+            <a:off x="-3718244" y="11430000"/>
+            <a:ext cx="7436487" cy="6858000"/>
+          </a:xfrm>
+          <a:prstGeom prst="rect">
+            <a:avLst/>
+          </a:prstGeom>
+        </p:spPr>
+      </p:pic>
+      <p:pic>
+        <p:nvPicPr>
+          <p:cNvPr id="20" name="Imagem 19">
+            <a:extLst>
+              <a:ext uri="{FF2B5EF4-FFF2-40B4-BE49-F238E27FC236}">
+                <a16:creationId xmlns:a16="http://schemas.microsoft.com/office/drawing/2014/main" id="{78A640CF-9EA0-20B9-337F-91172C1BF061}"/>
+              </a:ext>
+            </a:extLst>
+          </p:cNvPr>
+          <p:cNvPicPr>
+            <a:picLocks noChangeAspect="1"/>
+          </p:cNvPicPr>
+          <p:nvPr/>
+        </p:nvPicPr>
+        <p:blipFill>
+          <a:blip r:embed="rId9"/>
+          <a:stretch>
+            <a:fillRect/>
+          </a:stretch>
+        </p:blipFill>
+        <p:spPr>
+          <a:xfrm>
+            <a:off x="3718243" y="11430000"/>
+            <a:ext cx="7436487" cy="6858000"/>
+          </a:xfrm>
+          <a:prstGeom prst="rect">
+            <a:avLst/>
+          </a:prstGeom>
+        </p:spPr>
+      </p:pic>
+      <p:sp>
+        <p:nvSpPr>
+          <p:cNvPr id="21" name="Retângulo 20">
+            <a:extLst>
+              <a:ext uri="{FF2B5EF4-FFF2-40B4-BE49-F238E27FC236}">
+                <a16:creationId xmlns:a16="http://schemas.microsoft.com/office/drawing/2014/main" id="{D7099157-9C02-7BE1-0EEE-8F47317E820F}"/>
+              </a:ext>
+            </a:extLst>
+          </p:cNvPr>
+          <p:cNvSpPr/>
+          <p:nvPr/>
+        </p:nvSpPr>
+        <p:spPr>
+          <a:xfrm>
+            <a:off x="-3718244" y="-10345103"/>
+            <a:ext cx="14872974" cy="1201103"/>
+          </a:xfrm>
+          <a:prstGeom prst="rect">
+            <a:avLst/>
+          </a:prstGeom>
+          <a:solidFill>
+            <a:schemeClr val="bg1"/>
+          </a:solidFill>
+          <a:ln>
+            <a:noFill/>
+          </a:ln>
+        </p:spPr>
+        <p:style>
+          <a:lnRef idx="2">
+            <a:schemeClr val="accent1">
+              <a:shade val="15000"/>
+            </a:schemeClr>
+          </a:lnRef>
+          <a:fillRef idx="1">
+            <a:schemeClr val="accent1"/>
+          </a:fillRef>
+          <a:effectRef idx="0">
+            <a:schemeClr val="accent1"/>
+          </a:effectRef>
+          <a:fontRef idx="minor">
+            <a:schemeClr val="lt1"/>
+          </a:fontRef>
+        </p:style>
+        <p:txBody>
+          <a:bodyPr rtlCol="0" anchor="ctr"/>
+          <a:lstStyle/>
+          <a:p>
+            <a:pPr algn="ctr"/>
+            <a:endParaRPr lang="pt-BR" dirty="0"/>
+          </a:p>
+        </p:txBody>
+      </p:sp>
+      <p:pic>
+        <p:nvPicPr>
+          <p:cNvPr id="24" name="Imagem 23">
+            <a:extLst>
+              <a:ext uri="{FF2B5EF4-FFF2-40B4-BE49-F238E27FC236}">
+                <a16:creationId xmlns:a16="http://schemas.microsoft.com/office/drawing/2014/main" id="{389AFAEC-0542-FC9F-491E-3E51C7A668FC}"/>
+              </a:ext>
+            </a:extLst>
+          </p:cNvPr>
+          <p:cNvPicPr>
+            <a:picLocks noChangeAspect="1"/>
+          </p:cNvPicPr>
+          <p:nvPr/>
+        </p:nvPicPr>
+        <p:blipFill>
+          <a:blip r:embed="rId10"/>
+          <a:stretch>
+            <a:fillRect/>
+          </a:stretch>
+        </p:blipFill>
+        <p:spPr>
+          <a:xfrm>
+            <a:off x="0" y="-10326727"/>
+            <a:ext cx="6834208" cy="1182727"/>
+          </a:xfrm>
+          <a:prstGeom prst="rect">
+            <a:avLst/>
+          </a:prstGeom>
+        </p:spPr>
+      </p:pic>
+    </p:spTree>
+    <p:extLst>
+      <p:ext uri="{BB962C8B-B14F-4D97-AF65-F5344CB8AC3E}">
+        <p14:creationId xmlns:p14="http://schemas.microsoft.com/office/powerpoint/2010/main" val="2143358719"/>
+      </p:ext>
+    </p:extLst>
+  </p:cSld>
+  <p:clrMapOvr>
+    <a:masterClrMapping/>
+  </p:clrMapOvr>
+</p:sld>
+</file>
+
+<file path=ppt/slides/slide5.xml><?xml version="1.0" encoding="utf-8"?>
+<p:sld xmlns:a="http://schemas.openxmlformats.org/drawingml/2006/main" xmlns:r="http://schemas.openxmlformats.org/officeDocument/2006/relationships" xmlns:p="http://schemas.openxmlformats.org/presentationml/2006/main">
+  <p:cSld>
+    <p:spTree>
+      <p:nvGrpSpPr>
+        <p:cNvPr id="1" name=""/>
+        <p:cNvGrpSpPr/>
+        <p:nvPr/>
+      </p:nvGrpSpPr>
+      <p:grpSpPr>
+        <a:xfrm>
+          <a:off x="0" y="0"/>
+          <a:ext cx="0" cy="0"/>
+          <a:chOff x="0" y="0"/>
+          <a:chExt cx="0" cy="0"/>
+        </a:xfrm>
+      </p:grpSpPr>
+      <p:pic>
+        <p:nvPicPr>
+          <p:cNvPr id="3" name="Imagem 2">
+            <a:extLst>
+              <a:ext uri="{FF2B5EF4-FFF2-40B4-BE49-F238E27FC236}">
+                <a16:creationId xmlns:a16="http://schemas.microsoft.com/office/drawing/2014/main" id="{753E5990-D118-21BD-92C4-8B15A6526E61}"/>
+              </a:ext>
+            </a:extLst>
+          </p:cNvPr>
+          <p:cNvPicPr>
+            <a:picLocks noChangeAspect="1"/>
+          </p:cNvPicPr>
+          <p:nvPr/>
+        </p:nvPicPr>
+        <p:blipFill rotWithShape="1">
+          <a:blip r:embed="rId2"/>
+          <a:srcRect r="52730"/>
+          <a:stretch/>
+        </p:blipFill>
+        <p:spPr>
+          <a:xfrm>
+            <a:off x="838200" y="731191"/>
+            <a:ext cx="2066925" cy="1181265"/>
+          </a:xfrm>
+          <a:prstGeom prst="rect">
+            <a:avLst/>
+          </a:prstGeom>
+        </p:spPr>
+      </p:pic>
+      <p:pic>
+        <p:nvPicPr>
+          <p:cNvPr id="4" name="Imagem 3">
+            <a:extLst>
+              <a:ext uri="{FF2B5EF4-FFF2-40B4-BE49-F238E27FC236}">
+                <a16:creationId xmlns:a16="http://schemas.microsoft.com/office/drawing/2014/main" id="{5BA6182E-57C7-78B3-7480-732434A62254}"/>
+              </a:ext>
+            </a:extLst>
+          </p:cNvPr>
+          <p:cNvPicPr>
+            <a:picLocks noChangeAspect="1"/>
+          </p:cNvPicPr>
+          <p:nvPr/>
+        </p:nvPicPr>
+        <p:blipFill rotWithShape="1">
+          <a:blip r:embed="rId2"/>
+          <a:srcRect l="47030" r="37773" b="49977"/>
+          <a:stretch/>
+        </p:blipFill>
+        <p:spPr>
+          <a:xfrm>
+            <a:off x="3452806" y="1014096"/>
+            <a:ext cx="664484" cy="590907"/>
+          </a:xfrm>
+          <a:prstGeom prst="rect">
+            <a:avLst/>
+          </a:prstGeom>
+        </p:spPr>
+      </p:pic>
+      <p:pic>
+        <p:nvPicPr>
+          <p:cNvPr id="5" name="Imagem 4">
+            <a:extLst>
+              <a:ext uri="{FF2B5EF4-FFF2-40B4-BE49-F238E27FC236}">
+                <a16:creationId xmlns:a16="http://schemas.microsoft.com/office/drawing/2014/main" id="{63747EEC-0E58-87DE-3590-31B1694CB435}"/>
+              </a:ext>
+            </a:extLst>
+          </p:cNvPr>
+          <p:cNvPicPr>
+            <a:picLocks noChangeAspect="1"/>
+          </p:cNvPicPr>
+          <p:nvPr/>
+        </p:nvPicPr>
+        <p:blipFill rotWithShape="1">
+          <a:blip r:embed="rId2"/>
+          <a:srcRect l="47030" t="49977" r="37773"/>
+          <a:stretch/>
+        </p:blipFill>
+        <p:spPr>
+          <a:xfrm>
+            <a:off x="4076749" y="1085149"/>
+            <a:ext cx="664484" cy="590907"/>
+          </a:xfrm>
+          <a:prstGeom prst="rect">
+            <a:avLst/>
+          </a:prstGeom>
+        </p:spPr>
+      </p:pic>
+      <p:pic>
+        <p:nvPicPr>
+          <p:cNvPr id="6" name="Imagem 5">
+            <a:extLst>
+              <a:ext uri="{FF2B5EF4-FFF2-40B4-BE49-F238E27FC236}">
+                <a16:creationId xmlns:a16="http://schemas.microsoft.com/office/drawing/2014/main" id="{524CB9C1-D3D5-0472-3572-574AAC700466}"/>
+              </a:ext>
+            </a:extLst>
+          </p:cNvPr>
+          <p:cNvPicPr>
+            <a:picLocks noChangeAspect="1"/>
+          </p:cNvPicPr>
+          <p:nvPr/>
+        </p:nvPicPr>
+        <p:blipFill rotWithShape="1">
+          <a:blip r:embed="rId2"/>
+          <a:srcRect l="63382" r="21421" b="49977"/>
+          <a:stretch/>
+        </p:blipFill>
+        <p:spPr>
+          <a:xfrm>
+            <a:off x="4741233" y="1019175"/>
+            <a:ext cx="664484" cy="590907"/>
+          </a:xfrm>
+          <a:prstGeom prst="rect">
+            <a:avLst/>
+          </a:prstGeom>
+        </p:spPr>
+      </p:pic>
+      <p:pic>
+        <p:nvPicPr>
+          <p:cNvPr id="13" name="Imagem 12">
+            <a:extLst>
+              <a:ext uri="{FF2B5EF4-FFF2-40B4-BE49-F238E27FC236}">
+                <a16:creationId xmlns:a16="http://schemas.microsoft.com/office/drawing/2014/main" id="{A3581821-C6CC-4608-EB45-2B6DAB905C42}"/>
+              </a:ext>
+            </a:extLst>
+          </p:cNvPr>
+          <p:cNvPicPr>
+            <a:picLocks noChangeAspect="1"/>
+          </p:cNvPicPr>
+          <p:nvPr/>
+        </p:nvPicPr>
+        <p:blipFill>
+          <a:blip r:embed="rId3"/>
+          <a:stretch>
+            <a:fillRect/>
+          </a:stretch>
+        </p:blipFill>
+        <p:spPr>
+          <a:xfrm>
+            <a:off x="2993784" y="1190079"/>
+            <a:ext cx="543001" cy="323895"/>
+          </a:xfrm>
+          <a:prstGeom prst="rect">
+            <a:avLst/>
+          </a:prstGeom>
+        </p:spPr>
+      </p:pic>
+      <p:pic>
+        <p:nvPicPr>
+          <p:cNvPr id="7" name="Imagem 6">
+            <a:extLst>
+              <a:ext uri="{FF2B5EF4-FFF2-40B4-BE49-F238E27FC236}">
+                <a16:creationId xmlns:a16="http://schemas.microsoft.com/office/drawing/2014/main" id="{E51C25A6-1AD1-5A5E-3966-D1F2D474DE6F}"/>
+              </a:ext>
+            </a:extLst>
+          </p:cNvPr>
+          <p:cNvPicPr>
+            <a:picLocks noChangeAspect="1"/>
+          </p:cNvPicPr>
+          <p:nvPr/>
+        </p:nvPicPr>
+        <p:blipFill rotWithShape="1">
+          <a:blip r:embed="rId2"/>
+          <a:srcRect l="79734" b="49977"/>
+          <a:stretch/>
+        </p:blipFill>
+        <p:spPr>
+          <a:xfrm>
+            <a:off x="6085441" y="1016128"/>
+            <a:ext cx="886130" cy="590907"/>
+          </a:xfrm>
+          <a:prstGeom prst="rect">
+            <a:avLst/>
+          </a:prstGeom>
+        </p:spPr>
+      </p:pic>
+      <p:pic>
+        <p:nvPicPr>
+          <p:cNvPr id="8" name="Imagem 7">
+            <a:extLst>
+              <a:ext uri="{FF2B5EF4-FFF2-40B4-BE49-F238E27FC236}">
+                <a16:creationId xmlns:a16="http://schemas.microsoft.com/office/drawing/2014/main" id="{CBD8D491-EAD1-8A81-E2C1-3363BDCE857C}"/>
+              </a:ext>
+            </a:extLst>
+          </p:cNvPr>
+          <p:cNvPicPr>
+            <a:picLocks noChangeAspect="1"/>
+          </p:cNvPicPr>
+          <p:nvPr/>
+        </p:nvPicPr>
+        <p:blipFill rotWithShape="1">
+          <a:blip r:embed="rId2"/>
+          <a:srcRect l="61300" t="49977" r="21232"/>
+          <a:stretch/>
+        </p:blipFill>
+        <p:spPr>
+          <a:xfrm>
+            <a:off x="5338673" y="1077528"/>
+            <a:ext cx="763793" cy="590907"/>
+          </a:xfrm>
+          <a:prstGeom prst="rect">
+            <a:avLst/>
+          </a:prstGeom>
+        </p:spPr>
+      </p:pic>
+      <p:pic>
+        <p:nvPicPr>
+          <p:cNvPr id="9" name="Imagem 8">
+            <a:extLst>
+              <a:ext uri="{FF2B5EF4-FFF2-40B4-BE49-F238E27FC236}">
+                <a16:creationId xmlns:a16="http://schemas.microsoft.com/office/drawing/2014/main" id="{E791C74A-25B6-51FF-E5F6-90CFDF304F41}"/>
+              </a:ext>
+            </a:extLst>
+          </p:cNvPr>
+          <p:cNvPicPr>
+            <a:picLocks noChangeAspect="1"/>
+          </p:cNvPicPr>
+          <p:nvPr/>
+        </p:nvPicPr>
+        <p:blipFill rotWithShape="1">
+          <a:blip r:embed="rId2"/>
+          <a:srcRect l="79734" t="49977"/>
+          <a:stretch/>
+        </p:blipFill>
+        <p:spPr>
+          <a:xfrm>
+            <a:off x="6787905" y="1077528"/>
+            <a:ext cx="886130" cy="590907"/>
+          </a:xfrm>
+          <a:prstGeom prst="rect">
+            <a:avLst/>
+          </a:prstGeom>
+        </p:spPr>
+      </p:pic>
+    </p:spTree>
+    <p:extLst>
+      <p:ext uri="{BB962C8B-B14F-4D97-AF65-F5344CB8AC3E}">
+        <p14:creationId xmlns:p14="http://schemas.microsoft.com/office/powerpoint/2010/main" val="898400793"/>
+      </p:ext>
+    </p:extLst>
+  </p:cSld>
+  <p:clrMapOvr>
+    <a:masterClrMapping/>
+  </p:clrMapOvr>
+</p:sld>
+</file>
+
 <file path=ppt/theme/theme1.xml><?xml version="1.0" encoding="utf-8"?>
 <a:theme xmlns:a="http://schemas.openxmlformats.org/drawingml/2006/main" name="Tema do Office">
   <a:themeElements>

</xml_diff>

<commit_message>
figura 1 em hd
</commit_message>
<xml_diff>
--- a/bubleplots.pptx
+++ b/bubleplots.pptx
@@ -7,9 +7,10 @@
   <p:sldIdLst>
     <p:sldId id="267" r:id="rId2"/>
     <p:sldId id="266" r:id="rId3"/>
-    <p:sldId id="268" r:id="rId4"/>
-    <p:sldId id="269" r:id="rId5"/>
-    <p:sldId id="270" r:id="rId6"/>
+    <p:sldId id="271" r:id="rId4"/>
+    <p:sldId id="268" r:id="rId5"/>
+    <p:sldId id="269" r:id="rId6"/>
+    <p:sldId id="270" r:id="rId7"/>
   </p:sldIdLst>
   <p:sldSz cx="9144000" cy="6858000" type="screen4x3"/>
   <p:notesSz cx="6858000" cy="9144000"/>
@@ -119,7 +120,7 @@
 <file path=ppt/revisionInfo.xml><?xml version="1.0" encoding="utf-8"?>
 <p1510:revInfo xmlns:a="http://schemas.openxmlformats.org/drawingml/2006/main" xmlns:r="http://schemas.openxmlformats.org/officeDocument/2006/relationships" xmlns:p1510="http://schemas.microsoft.com/office/powerpoint/2015/10/main">
   <p1510:revLst>
-    <p1510:client id="{BD409E65-DA0C-4C99-81B5-98E95D8F4708}" v="144" dt="2024-03-13T19:01:16.853"/>
+    <p1510:client id="{BD409E65-DA0C-4C99-81B5-98E95D8F4708}" v="146" dt="2024-03-14T13:50:13.777"/>
   </p1510:revLst>
 </p1510:revInfo>
 </file>
@@ -129,7 +130,7 @@
   <pc:docChgLst>
     <pc:chgData name="Saulo Gil" userId="e4b858b1fb629067" providerId="LiveId" clId="{BD409E65-DA0C-4C99-81B5-98E95D8F4708}"/>
     <pc:docChg chg="undo custSel addSld delSld modSld sldOrd modMainMaster">
-      <pc:chgData name="Saulo Gil" userId="e4b858b1fb629067" providerId="LiveId" clId="{BD409E65-DA0C-4C99-81B5-98E95D8F4708}" dt="2024-03-13T19:01:50.152" v="727" actId="1076"/>
+      <pc:chgData name="Saulo Gil" userId="e4b858b1fb629067" providerId="LiveId" clId="{BD409E65-DA0C-4C99-81B5-98E95D8F4708}" dt="2024-03-14T13:50:16.067" v="731" actId="962"/>
       <pc:docMkLst>
         <pc:docMk/>
       </pc:docMkLst>
@@ -1297,6 +1298,21 @@
           <pc:sldMk cId="1138283857" sldId="271"/>
         </pc:sldMkLst>
       </pc:sldChg>
+      <pc:sldChg chg="addSp modSp new mod">
+        <pc:chgData name="Saulo Gil" userId="e4b858b1fb629067" providerId="LiveId" clId="{BD409E65-DA0C-4C99-81B5-98E95D8F4708}" dt="2024-03-14T13:50:16.067" v="731" actId="962"/>
+        <pc:sldMkLst>
+          <pc:docMk/>
+          <pc:sldMk cId="1570678754" sldId="271"/>
+        </pc:sldMkLst>
+        <pc:picChg chg="add mod">
+          <ac:chgData name="Saulo Gil" userId="e4b858b1fb629067" providerId="LiveId" clId="{BD409E65-DA0C-4C99-81B5-98E95D8F4708}" dt="2024-03-14T13:50:16.067" v="731" actId="962"/>
+          <ac:picMkLst>
+            <pc:docMk/>
+            <pc:sldMk cId="1570678754" sldId="271"/>
+            <ac:picMk id="3" creationId="{806867C8-F10B-AED5-7F43-82630500D9C1}"/>
+          </ac:picMkLst>
+        </pc:picChg>
+      </pc:sldChg>
       <pc:sldChg chg="addSp modSp add del mod setBg">
         <pc:chgData name="Saulo Gil" userId="e4b858b1fb629067" providerId="LiveId" clId="{BD409E65-DA0C-4C99-81B5-98E95D8F4708}" dt="2024-03-12T16:04:05.166" v="31" actId="47"/>
         <pc:sldMkLst>
@@ -1909,7 +1925,7 @@
           <a:p>
             <a:fld id="{A102AD8F-44E2-418A-8E72-7EA614DA287B}" type="datetimeFigureOut">
               <a:rPr lang="pt-BR" smtClean="0"/>
-              <a:t>13/03/2024</a:t>
+              <a:t>14/03/2024</a:t>
             </a:fld>
             <a:endParaRPr lang="pt-BR"/>
           </a:p>
@@ -2079,7 +2095,7 @@
           <a:p>
             <a:fld id="{A102AD8F-44E2-418A-8E72-7EA614DA287B}" type="datetimeFigureOut">
               <a:rPr lang="pt-BR" smtClean="0"/>
-              <a:t>13/03/2024</a:t>
+              <a:t>14/03/2024</a:t>
             </a:fld>
             <a:endParaRPr lang="pt-BR"/>
           </a:p>
@@ -2259,7 +2275,7 @@
           <a:p>
             <a:fld id="{A102AD8F-44E2-418A-8E72-7EA614DA287B}" type="datetimeFigureOut">
               <a:rPr lang="pt-BR" smtClean="0"/>
-              <a:t>13/03/2024</a:t>
+              <a:t>14/03/2024</a:t>
             </a:fld>
             <a:endParaRPr lang="pt-BR"/>
           </a:p>
@@ -2429,7 +2445,7 @@
           <a:p>
             <a:fld id="{A102AD8F-44E2-418A-8E72-7EA614DA287B}" type="datetimeFigureOut">
               <a:rPr lang="pt-BR" smtClean="0"/>
-              <a:t>13/03/2024</a:t>
+              <a:t>14/03/2024</a:t>
             </a:fld>
             <a:endParaRPr lang="pt-BR"/>
           </a:p>
@@ -2675,7 +2691,7 @@
           <a:p>
             <a:fld id="{A102AD8F-44E2-418A-8E72-7EA614DA287B}" type="datetimeFigureOut">
               <a:rPr lang="pt-BR" smtClean="0"/>
-              <a:t>13/03/2024</a:t>
+              <a:t>14/03/2024</a:t>
             </a:fld>
             <a:endParaRPr lang="pt-BR"/>
           </a:p>
@@ -2907,7 +2923,7 @@
           <a:p>
             <a:fld id="{A102AD8F-44E2-418A-8E72-7EA614DA287B}" type="datetimeFigureOut">
               <a:rPr lang="pt-BR" smtClean="0"/>
-              <a:t>13/03/2024</a:t>
+              <a:t>14/03/2024</a:t>
             </a:fld>
             <a:endParaRPr lang="pt-BR"/>
           </a:p>
@@ -3274,7 +3290,7 @@
           <a:p>
             <a:fld id="{A102AD8F-44E2-418A-8E72-7EA614DA287B}" type="datetimeFigureOut">
               <a:rPr lang="pt-BR" smtClean="0"/>
-              <a:t>13/03/2024</a:t>
+              <a:t>14/03/2024</a:t>
             </a:fld>
             <a:endParaRPr lang="pt-BR"/>
           </a:p>
@@ -3392,7 +3408,7 @@
           <a:p>
             <a:fld id="{A102AD8F-44E2-418A-8E72-7EA614DA287B}" type="datetimeFigureOut">
               <a:rPr lang="pt-BR" smtClean="0"/>
-              <a:t>13/03/2024</a:t>
+              <a:t>14/03/2024</a:t>
             </a:fld>
             <a:endParaRPr lang="pt-BR"/>
           </a:p>
@@ -3487,7 +3503,7 @@
           <a:p>
             <a:fld id="{A102AD8F-44E2-418A-8E72-7EA614DA287B}" type="datetimeFigureOut">
               <a:rPr lang="pt-BR" smtClean="0"/>
-              <a:t>13/03/2024</a:t>
+              <a:t>14/03/2024</a:t>
             </a:fld>
             <a:endParaRPr lang="pt-BR"/>
           </a:p>
@@ -3764,7 +3780,7 @@
           <a:p>
             <a:fld id="{A102AD8F-44E2-418A-8E72-7EA614DA287B}" type="datetimeFigureOut">
               <a:rPr lang="pt-BR" smtClean="0"/>
-              <a:t>13/03/2024</a:t>
+              <a:t>14/03/2024</a:t>
             </a:fld>
             <a:endParaRPr lang="pt-BR"/>
           </a:p>
@@ -4021,7 +4037,7 @@
           <a:p>
             <a:fld id="{A102AD8F-44E2-418A-8E72-7EA614DA287B}" type="datetimeFigureOut">
               <a:rPr lang="pt-BR" smtClean="0"/>
-              <a:t>13/03/2024</a:t>
+              <a:t>14/03/2024</a:t>
             </a:fld>
             <a:endParaRPr lang="pt-BR"/>
           </a:p>
@@ -4234,7 +4250,7 @@
           <a:p>
             <a:fld id="{A102AD8F-44E2-418A-8E72-7EA614DA287B}" type="datetimeFigureOut">
               <a:rPr lang="pt-BR" smtClean="0"/>
-              <a:t>13/03/2024</a:t>
+              <a:t>14/03/2024</a:t>
             </a:fld>
             <a:endParaRPr lang="pt-BR"/>
           </a:p>
@@ -5116,6 +5132,72 @@
           <a:chExt cx="0" cy="0"/>
         </a:xfrm>
       </p:grpSpPr>
+      <p:pic>
+        <p:nvPicPr>
+          <p:cNvPr id="3" name="Imagem 2" descr="Tabela&#10;&#10;Descrição gerada automaticamente">
+            <a:extLst>
+              <a:ext uri="{FF2B5EF4-FFF2-40B4-BE49-F238E27FC236}">
+                <a16:creationId xmlns:a16="http://schemas.microsoft.com/office/drawing/2014/main" id="{806867C8-F10B-AED5-7F43-82630500D9C1}"/>
+              </a:ext>
+            </a:extLst>
+          </p:cNvPr>
+          <p:cNvPicPr>
+            <a:picLocks noChangeAspect="1"/>
+          </p:cNvPicPr>
+          <p:nvPr/>
+        </p:nvPicPr>
+        <p:blipFill>
+          <a:blip r:embed="rId2">
+            <a:extLst>
+              <a:ext uri="{28A0092B-C50C-407E-A947-70E740481C1C}">
+                <a14:useLocalDpi xmlns:a14="http://schemas.microsoft.com/office/drawing/2010/main" val="0"/>
+              </a:ext>
+            </a:extLst>
+          </a:blip>
+          <a:stretch>
+            <a:fillRect/>
+          </a:stretch>
+        </p:blipFill>
+        <p:spPr>
+          <a:xfrm>
+            <a:off x="2649645" y="0"/>
+            <a:ext cx="3844709" cy="6858000"/>
+          </a:xfrm>
+          <a:prstGeom prst="rect">
+            <a:avLst/>
+          </a:prstGeom>
+        </p:spPr>
+      </p:pic>
+    </p:spTree>
+    <p:extLst>
+      <p:ext uri="{BB962C8B-B14F-4D97-AF65-F5344CB8AC3E}">
+        <p14:creationId xmlns:p14="http://schemas.microsoft.com/office/powerpoint/2010/main" val="1570678754"/>
+      </p:ext>
+    </p:extLst>
+  </p:cSld>
+  <p:clrMapOvr>
+    <a:masterClrMapping/>
+  </p:clrMapOvr>
+</p:sld>
+</file>
+
+<file path=ppt/slides/slide4.xml><?xml version="1.0" encoding="utf-8"?>
+<p:sld xmlns:a="http://schemas.openxmlformats.org/drawingml/2006/main" xmlns:r="http://schemas.openxmlformats.org/officeDocument/2006/relationships" xmlns:p="http://schemas.openxmlformats.org/presentationml/2006/main">
+  <p:cSld>
+    <p:spTree>
+      <p:nvGrpSpPr>
+        <p:cNvPr id="1" name=""/>
+        <p:cNvGrpSpPr/>
+        <p:nvPr/>
+      </p:nvGrpSpPr>
+      <p:grpSpPr>
+        <a:xfrm>
+          <a:off x="0" y="0"/>
+          <a:ext cx="0" cy="0"/>
+          <a:chOff x="0" y="0"/>
+          <a:chExt cx="0" cy="0"/>
+        </a:xfrm>
+      </p:grpSpPr>
       <p:sp>
         <p:nvSpPr>
           <p:cNvPr id="2" name="CaixaDeTexto 1">
@@ -5165,7 +5247,7 @@
 </p:sld>
 </file>
 
-<file path=ppt/slides/slide4.xml><?xml version="1.0" encoding="utf-8"?>
+<file path=ppt/slides/slide5.xml><?xml version="1.0" encoding="utf-8"?>
 <p:sld xmlns:a="http://schemas.openxmlformats.org/drawingml/2006/main" xmlns:r="http://schemas.openxmlformats.org/officeDocument/2006/relationships" xmlns:p="http://schemas.openxmlformats.org/presentationml/2006/main">
   <p:cSld>
     <p:spTree>
@@ -5517,7 +5599,7 @@
 </p:sld>
 </file>
 
-<file path=ppt/slides/slide5.xml><?xml version="1.0" encoding="utf-8"?>
+<file path=ppt/slides/slide6.xml><?xml version="1.0" encoding="utf-8"?>
 <p:sld xmlns:a="http://schemas.openxmlformats.org/drawingml/2006/main" xmlns:r="http://schemas.openxmlformats.org/officeDocument/2006/relationships" xmlns:p="http://schemas.openxmlformats.org/presentationml/2006/main">
   <p:cSld>
     <p:spTree>

</xml_diff>